<commit_message>
added 80% of new slide
</commit_message>
<xml_diff>
--- a/Assessment Mikita Charniauski.pptx
+++ b/Assessment Mikita Charniauski.pptx
@@ -5,16 +5,17 @@
     <p:sldMasterId id="2147483730" r:id="rId4"/>
   </p:sldMasterIdLst>
   <p:notesMasterIdLst>
-    <p:notesMasterId r:id="rId9"/>
+    <p:notesMasterId r:id="rId10"/>
   </p:notesMasterIdLst>
   <p:handoutMasterIdLst>
-    <p:handoutMasterId r:id="rId10"/>
+    <p:handoutMasterId r:id="rId11"/>
   </p:handoutMasterIdLst>
   <p:sldIdLst>
     <p:sldId id="448" r:id="rId5"/>
     <p:sldId id="271" r:id="rId6"/>
     <p:sldId id="449" r:id="rId7"/>
     <p:sldId id="450" r:id="rId8"/>
+    <p:sldId id="451" r:id="rId9"/>
   </p:sldIdLst>
   <p:sldSz cx="9144000" cy="5143500" type="screen16x9"/>
   <p:notesSz cx="6858000" cy="9144000"/>
@@ -385,7 +386,7 @@
           <a:p>
             <a:fld id="{7F5E9BF7-95E4-A242-BA1D-05FDCF603BE6}" type="datetime1">
               <a:rPr lang="en-US" smtClean="0"/>
-              <a:t>5/15/2018</a:t>
+              <a:t>5/20/2018</a:t>
             </a:fld>
             <a:endParaRPr lang="en-US"/>
           </a:p>
@@ -551,7 +552,7 @@
           <a:p>
             <a:fld id="{165DBCB1-0306-AD41-9452-11E7C08D5C04}" type="datetime1">
               <a:rPr lang="en-US" smtClean="0"/>
-              <a:t>5/15/2018</a:t>
+              <a:t>5/20/2018</a:t>
             </a:fld>
             <a:endParaRPr lang="en-US"/>
           </a:p>
@@ -3564,6 +3565,204 @@
 </p:sldLayout>
 </file>
 
+<file path=ppt/slideLayouts/slideLayout9.xml><?xml version="1.0" encoding="utf-8"?>
+<p:sldLayout xmlns:a="http://schemas.openxmlformats.org/drawingml/2006/main" xmlns:r="http://schemas.openxmlformats.org/officeDocument/2006/relationships" xmlns:p="http://schemas.openxmlformats.org/presentationml/2006/main" userDrawn="1">
+  <p:cSld name="Bullets and Image">
+    <p:spTree>
+      <p:nvGrpSpPr>
+        <p:cNvPr id="1" name=""/>
+        <p:cNvGrpSpPr/>
+        <p:nvPr/>
+      </p:nvGrpSpPr>
+      <p:grpSpPr>
+        <a:xfrm>
+          <a:off x="0" y="0"/>
+          <a:ext cx="0" cy="0"/>
+          <a:chOff x="0" y="0"/>
+          <a:chExt cx="0" cy="0"/>
+        </a:xfrm>
+      </p:grpSpPr>
+      <p:sp>
+        <p:nvSpPr>
+          <p:cNvPr id="5" name="Picture Placeholder 4"/>
+          <p:cNvSpPr>
+            <a:spLocks noGrp="1"/>
+          </p:cNvSpPr>
+          <p:nvPr>
+            <p:ph type="pic" sz="quarter" idx="11" hasCustomPrompt="1"/>
+          </p:nvPr>
+        </p:nvSpPr>
+        <p:spPr>
+          <a:xfrm>
+            <a:off x="4568265" y="704273"/>
+            <a:ext cx="4575735" cy="4156364"/>
+          </a:xfrm>
+          <a:prstGeom prst="rect">
+            <a:avLst/>
+          </a:prstGeom>
+        </p:spPr>
+        <p:txBody>
+          <a:bodyPr vert="horz" anchor="ctr"/>
+          <a:lstStyle>
+            <a:lvl1pPr marL="0" indent="0" algn="ctr">
+              <a:buNone/>
+              <a:defRPr/>
+            </a:lvl1pPr>
+          </a:lstStyle>
+          <a:p>
+            <a:r>
+              <a:rPr lang="en-US" dirty="0"/>
+              <a:t> </a:t>
+            </a:r>
+          </a:p>
+        </p:txBody>
+      </p:sp>
+      <p:sp>
+        <p:nvSpPr>
+          <p:cNvPr id="3" name="Text Placeholder 2"/>
+          <p:cNvSpPr>
+            <a:spLocks noGrp="1"/>
+          </p:cNvSpPr>
+          <p:nvPr>
+            <p:ph idx="1" hasCustomPrompt="1"/>
+          </p:nvPr>
+        </p:nvSpPr>
+        <p:spPr>
+          <a:xfrm>
+            <a:off x="360364" y="1079898"/>
+            <a:ext cx="3810584" cy="3383280"/>
+          </a:xfrm>
+          <a:prstGeom prst="rect">
+            <a:avLst/>
+          </a:prstGeom>
+        </p:spPr>
+        <p:txBody>
+          <a:bodyPr vert="horz" lIns="68580" tIns="34290" rIns="68580" bIns="34290" rtlCol="0">
+            <a:normAutofit/>
+          </a:bodyPr>
+          <a:lstStyle>
+            <a:lvl1pPr marL="130302" marR="0" indent="-130302" algn="l" defTabSz="342900" rtl="0" eaLnBrk="1" fontAlgn="auto" latinLnBrk="0" hangingPunct="1">
+              <a:lnSpc>
+                <a:spcPct val="120000"/>
+              </a:lnSpc>
+              <a:spcBef>
+                <a:spcPts val="0"/>
+              </a:spcBef>
+              <a:spcAft>
+                <a:spcPts val="750"/>
+              </a:spcAft>
+              <a:buClr>
+                <a:schemeClr val="accent2"/>
+              </a:buClr>
+              <a:buSzTx/>
+              <a:buFont typeface="Arial"/>
+              <a:buChar char="•"/>
+              <a:tabLst/>
+              <a:defRPr sz="1200" baseline="0"/>
+            </a:lvl1pPr>
+            <a:lvl2pPr>
+              <a:defRPr sz="1200"/>
+            </a:lvl2pPr>
+            <a:lvl3pPr>
+              <a:defRPr sz="1200"/>
+            </a:lvl3pPr>
+            <a:lvl4pPr>
+              <a:defRPr sz="1200"/>
+            </a:lvl4pPr>
+            <a:lvl5pPr>
+              <a:defRPr sz="1200"/>
+            </a:lvl5pPr>
+          </a:lstStyle>
+          <a:p>
+            <a:pPr lvl="0"/>
+            <a:r>
+              <a:rPr lang="en-US" dirty="0"/>
+              <a:t>Click to add bulleted list</a:t>
+            </a:r>
+          </a:p>
+          <a:p>
+            <a:pPr lvl="0"/>
+            <a:r>
+              <a:rPr lang="en-US" dirty="0"/>
+              <a:t>Click to add bulleted list</a:t>
+            </a:r>
+          </a:p>
+          <a:p>
+            <a:pPr lvl="0"/>
+            <a:r>
+              <a:rPr lang="en-US" dirty="0"/>
+              <a:t>Click to add bulleted list</a:t>
+            </a:r>
+          </a:p>
+        </p:txBody>
+      </p:sp>
+      <p:sp>
+        <p:nvSpPr>
+          <p:cNvPr id="4" name="Text Placeholder 6"/>
+          <p:cNvSpPr>
+            <a:spLocks noGrp="1"/>
+          </p:cNvSpPr>
+          <p:nvPr>
+            <p:ph type="body" sz="quarter" idx="10" hasCustomPrompt="1"/>
+          </p:nvPr>
+        </p:nvSpPr>
+        <p:spPr>
+          <a:xfrm>
+            <a:off x="0" y="0"/>
+            <a:ext cx="9144000" cy="699516"/>
+          </a:xfrm>
+          <a:prstGeom prst="rect">
+            <a:avLst/>
+          </a:prstGeom>
+          <a:solidFill>
+            <a:schemeClr val="bg1"/>
+          </a:solidFill>
+          <a:ln>
+            <a:noFill/>
+          </a:ln>
+          <a:effectLst>
+            <a:outerShdw blurRad="40005" dist="25400" dir="5400000" algn="t" rotWithShape="0">
+              <a:prstClr val="black">
+                <a:alpha val="30000"/>
+              </a:prstClr>
+            </a:outerShdw>
+          </a:effectLst>
+        </p:spPr>
+        <p:txBody>
+          <a:bodyPr lIns="274320" tIns="34290" rIns="68580" bIns="34290" anchor="ctr" anchorCtr="0">
+            <a:normAutofit/>
+          </a:bodyPr>
+          <a:lstStyle>
+            <a:lvl1pPr marL="0" indent="0">
+              <a:buNone/>
+              <a:defRPr sz="2000" baseline="0">
+                <a:latin typeface="Arial Black"/>
+                <a:cs typeface="Arial Black"/>
+              </a:defRPr>
+            </a:lvl1pPr>
+          </a:lstStyle>
+          <a:p>
+            <a:pPr lvl="0"/>
+            <a:r>
+              <a:rPr lang="en-US" dirty="0"/>
+              <a:t>CLICK TO ADD TITLE</a:t>
+            </a:r>
+          </a:p>
+        </p:txBody>
+      </p:sp>
+    </p:spTree>
+    <p:extLst>
+      <p:ext uri="{BB962C8B-B14F-4D97-AF65-F5344CB8AC3E}">
+        <p14:creationId xmlns:p14="http://schemas.microsoft.com/office/powerpoint/2010/main" val="2554414125"/>
+      </p:ext>
+    </p:extLst>
+  </p:cSld>
+  <p:clrMapOvr>
+    <a:masterClrMapping/>
+  </p:clrMapOvr>
+</p:sldLayout>
+</file>
+
 <file path=ppt/slideMasters/slideMaster1.xml><?xml version="1.0" encoding="utf-8"?>
 <p:sldMaster xmlns:a="http://schemas.openxmlformats.org/drawingml/2006/main" xmlns:r="http://schemas.openxmlformats.org/officeDocument/2006/relationships" xmlns:p="http://schemas.openxmlformats.org/presentationml/2006/main" preserve="1">
   <p:cSld>
@@ -3755,7 +3954,7 @@
           <p:nvPr userDrawn="1"/>
         </p:nvPicPr>
         <p:blipFill>
-          <a:blip r:embed="rId10" cstate="screen">
+          <a:blip r:embed="rId11" cstate="screen">
             <a:extLst>
               <a:ext uri="{28A0092B-C50C-407E-A947-70E740481C1C}">
                 <a14:useLocalDpi xmlns:a14="http://schemas.microsoft.com/office/drawing/2010/main"/>
@@ -3793,6 +3992,7 @@
     <p:sldLayoutId id="2147483749" r:id="rId6"/>
     <p:sldLayoutId id="2147483752" r:id="rId7"/>
     <p:sldLayoutId id="2147483753" r:id="rId8"/>
+    <p:sldLayoutId id="2147483754" r:id="rId9"/>
   </p:sldLayoutIdLst>
   <p:txStyles>
     <p:titleStyle>
@@ -4165,12 +4365,16 @@
           <a:lstStyle/>
           <a:p>
             <a:r>
-              <a:rPr lang="en-US" dirty="0">
+              <a:rPr lang="en-US" dirty="0" smtClean="0">
                 <a:latin typeface="Trebuchet MS"/>
                 <a:cs typeface="Trebuchet MS"/>
               </a:rPr>
-              <a:t>October 5, 2017</a:t>
-            </a:r>
+              <a:t>June 19, 2018</a:t>
+            </a:r>
+            <a:endParaRPr lang="en-US" dirty="0">
+              <a:latin typeface="Trebuchet MS"/>
+              <a:cs typeface="Trebuchet MS"/>
+            </a:endParaRPr>
           </a:p>
         </p:txBody>
       </p:sp>
@@ -5021,12 +5225,6 @@
               </a:rPr>
               <a:t> architecture </a:t>
             </a:r>
-            <a:endParaRPr lang="en-US" sz="1400" dirty="0">
-              <a:solidFill>
-                <a:srgbClr val="444444"/>
-              </a:solidFill>
-              <a:ea typeface="ＭＳ Ｐゴシック" pitchFamily="34" charset="-128"/>
-            </a:endParaRPr>
           </a:p>
           <a:p>
             <a:endParaRPr lang="en-US" dirty="0"/>
@@ -5094,291 +5292,6 @@
           <a:chExt cx="0" cy="0"/>
         </a:xfrm>
       </p:grpSpPr>
-      <p:grpSp>
-        <p:nvGrpSpPr>
-          <p:cNvPr id="9" name="Group 8"/>
-          <p:cNvGrpSpPr/>
-          <p:nvPr/>
-        </p:nvGrpSpPr>
-        <p:grpSpPr>
-          <a:xfrm>
-            <a:off x="5939072" y="4582480"/>
-            <a:ext cx="821096" cy="176972"/>
-            <a:chOff x="4755358" y="4582480"/>
-            <a:chExt cx="821096" cy="176972"/>
-          </a:xfrm>
-        </p:grpSpPr>
-        <p:sp>
-          <p:nvSpPr>
-            <p:cNvPr id="3" name="Rectangle 2"/>
-            <p:cNvSpPr/>
-            <p:nvPr/>
-          </p:nvSpPr>
-          <p:spPr>
-            <a:xfrm>
-              <a:off x="4755358" y="4600462"/>
-              <a:ext cx="137160" cy="137160"/>
-            </a:xfrm>
-            <a:prstGeom prst="rect">
-              <a:avLst/>
-            </a:prstGeom>
-            <a:solidFill>
-              <a:schemeClr val="tx1"/>
-            </a:solidFill>
-            <a:ln>
-              <a:noFill/>
-            </a:ln>
-            <a:effectLst/>
-          </p:spPr>
-          <p:style>
-            <a:lnRef idx="1">
-              <a:schemeClr val="accent1"/>
-            </a:lnRef>
-            <a:fillRef idx="3">
-              <a:schemeClr val="accent1"/>
-            </a:fillRef>
-            <a:effectRef idx="2">
-              <a:schemeClr val="accent1"/>
-            </a:effectRef>
-            <a:fontRef idx="minor">
-              <a:schemeClr val="lt1"/>
-            </a:fontRef>
-          </p:style>
-          <p:txBody>
-            <a:bodyPr lIns="68580" tIns="34290" rIns="68580" bIns="34290" rtlCol="0" anchor="ctr"/>
-            <a:lstStyle/>
-            <a:p>
-              <a:pPr algn="ctr"/>
-              <a:endParaRPr lang="en-US" dirty="0"/>
-            </a:p>
-          </p:txBody>
-        </p:sp>
-        <p:sp>
-          <p:nvSpPr>
-            <p:cNvPr id="5" name="TextBox 4"/>
-            <p:cNvSpPr txBox="1"/>
-            <p:nvPr/>
-          </p:nvSpPr>
-          <p:spPr>
-            <a:xfrm>
-              <a:off x="4892518" y="4582480"/>
-              <a:ext cx="683936" cy="176972"/>
-            </a:xfrm>
-            <a:prstGeom prst="rect">
-              <a:avLst/>
-            </a:prstGeom>
-            <a:noFill/>
-          </p:spPr>
-          <p:txBody>
-            <a:bodyPr wrap="square" lIns="68580" tIns="34290" rIns="68580" bIns="34290" rtlCol="0">
-              <a:spAutoFit/>
-            </a:bodyPr>
-            <a:lstStyle/>
-            <a:p>
-              <a:r>
-                <a:rPr lang="en-US" sz="700" dirty="0">
-                  <a:solidFill>
-                    <a:schemeClr val="tx2"/>
-                  </a:solidFill>
-                  <a:latin typeface="Trebuchet MS"/>
-                  <a:cs typeface="Trebuchet MS"/>
-                </a:rPr>
-                <a:t>LOREM</a:t>
-              </a:r>
-            </a:p>
-          </p:txBody>
-        </p:sp>
-      </p:grpSp>
-      <p:grpSp>
-        <p:nvGrpSpPr>
-          <p:cNvPr id="10" name="Group 9"/>
-          <p:cNvGrpSpPr/>
-          <p:nvPr/>
-        </p:nvGrpSpPr>
-        <p:grpSpPr>
-          <a:xfrm>
-            <a:off x="6747197" y="4582480"/>
-            <a:ext cx="632304" cy="176972"/>
-            <a:chOff x="5563483" y="4582480"/>
-            <a:chExt cx="632304" cy="176972"/>
-          </a:xfrm>
-        </p:grpSpPr>
-        <p:sp>
-          <p:nvSpPr>
-            <p:cNvPr id="69" name="Rectangle 68"/>
-            <p:cNvSpPr/>
-            <p:nvPr/>
-          </p:nvSpPr>
-          <p:spPr>
-            <a:xfrm>
-              <a:off x="5563483" y="4600462"/>
-              <a:ext cx="137160" cy="137160"/>
-            </a:xfrm>
-            <a:prstGeom prst="rect">
-              <a:avLst/>
-            </a:prstGeom>
-            <a:solidFill>
-              <a:schemeClr val="accent2"/>
-            </a:solidFill>
-            <a:ln>
-              <a:noFill/>
-            </a:ln>
-            <a:effectLst/>
-          </p:spPr>
-          <p:style>
-            <a:lnRef idx="1">
-              <a:schemeClr val="accent1"/>
-            </a:lnRef>
-            <a:fillRef idx="3">
-              <a:schemeClr val="accent1"/>
-            </a:fillRef>
-            <a:effectRef idx="2">
-              <a:schemeClr val="accent1"/>
-            </a:effectRef>
-            <a:fontRef idx="minor">
-              <a:schemeClr val="lt1"/>
-            </a:fontRef>
-          </p:style>
-          <p:txBody>
-            <a:bodyPr lIns="68580" tIns="34290" rIns="68580" bIns="34290" rtlCol="0" anchor="ctr"/>
-            <a:lstStyle/>
-            <a:p>
-              <a:pPr algn="ctr"/>
-              <a:endParaRPr lang="en-US" dirty="0"/>
-            </a:p>
-          </p:txBody>
-        </p:sp>
-        <p:sp>
-          <p:nvSpPr>
-            <p:cNvPr id="78" name="TextBox 77"/>
-            <p:cNvSpPr txBox="1"/>
-            <p:nvPr/>
-          </p:nvSpPr>
-          <p:spPr>
-            <a:xfrm>
-              <a:off x="5700643" y="4582480"/>
-              <a:ext cx="495144" cy="176972"/>
-            </a:xfrm>
-            <a:prstGeom prst="rect">
-              <a:avLst/>
-            </a:prstGeom>
-            <a:noFill/>
-          </p:spPr>
-          <p:txBody>
-            <a:bodyPr wrap="square" lIns="68580" tIns="34290" rIns="68580" bIns="34290" rtlCol="0">
-              <a:spAutoFit/>
-            </a:bodyPr>
-            <a:lstStyle/>
-            <a:p>
-              <a:r>
-                <a:rPr lang="en-US" sz="700" dirty="0">
-                  <a:solidFill>
-                    <a:schemeClr val="tx2"/>
-                  </a:solidFill>
-                  <a:latin typeface="Trebuchet MS"/>
-                  <a:cs typeface="Trebuchet MS"/>
-                </a:rPr>
-                <a:t>IPSUM</a:t>
-              </a:r>
-            </a:p>
-          </p:txBody>
-        </p:sp>
-      </p:grpSp>
-      <p:grpSp>
-        <p:nvGrpSpPr>
-          <p:cNvPr id="11" name="Group 10"/>
-          <p:cNvGrpSpPr/>
-          <p:nvPr/>
-        </p:nvGrpSpPr>
-        <p:grpSpPr>
-          <a:xfrm>
-            <a:off x="7484801" y="4582479"/>
-            <a:ext cx="764731" cy="176972"/>
-            <a:chOff x="6301087" y="4582479"/>
-            <a:chExt cx="764731" cy="176972"/>
-          </a:xfrm>
-        </p:grpSpPr>
-        <p:sp>
-          <p:nvSpPr>
-            <p:cNvPr id="76" name="Rectangle 75"/>
-            <p:cNvSpPr/>
-            <p:nvPr/>
-          </p:nvSpPr>
-          <p:spPr>
-            <a:xfrm>
-              <a:off x="6301087" y="4600462"/>
-              <a:ext cx="137160" cy="137160"/>
-            </a:xfrm>
-            <a:prstGeom prst="rect">
-              <a:avLst/>
-            </a:prstGeom>
-            <a:solidFill>
-              <a:schemeClr val="accent4"/>
-            </a:solidFill>
-            <a:ln>
-              <a:noFill/>
-            </a:ln>
-            <a:effectLst/>
-          </p:spPr>
-          <p:style>
-            <a:lnRef idx="1">
-              <a:schemeClr val="accent1"/>
-            </a:lnRef>
-            <a:fillRef idx="3">
-              <a:schemeClr val="accent1"/>
-            </a:fillRef>
-            <a:effectRef idx="2">
-              <a:schemeClr val="accent1"/>
-            </a:effectRef>
-            <a:fontRef idx="minor">
-              <a:schemeClr val="lt1"/>
-            </a:fontRef>
-          </p:style>
-          <p:txBody>
-            <a:bodyPr lIns="68580" tIns="34290" rIns="68580" bIns="34290" rtlCol="0" anchor="ctr"/>
-            <a:lstStyle/>
-            <a:p>
-              <a:pPr algn="ctr"/>
-              <a:endParaRPr lang="en-US" dirty="0"/>
-            </a:p>
-          </p:txBody>
-        </p:sp>
-        <p:sp>
-          <p:nvSpPr>
-            <p:cNvPr id="79" name="TextBox 78"/>
-            <p:cNvSpPr txBox="1"/>
-            <p:nvPr/>
-          </p:nvSpPr>
-          <p:spPr>
-            <a:xfrm>
-              <a:off x="6437863" y="4582479"/>
-              <a:ext cx="627955" cy="176972"/>
-            </a:xfrm>
-            <a:prstGeom prst="rect">
-              <a:avLst/>
-            </a:prstGeom>
-            <a:noFill/>
-          </p:spPr>
-          <p:txBody>
-            <a:bodyPr wrap="square" lIns="68580" tIns="34290" rIns="68580" bIns="34290" rtlCol="0">
-              <a:spAutoFit/>
-            </a:bodyPr>
-            <a:lstStyle/>
-            <a:p>
-              <a:r>
-                <a:rPr lang="en-US" sz="700" dirty="0">
-                  <a:solidFill>
-                    <a:schemeClr val="tx2"/>
-                  </a:solidFill>
-                  <a:latin typeface="Trebuchet MS"/>
-                  <a:cs typeface="Trebuchet MS"/>
-                </a:rPr>
-                <a:t>DOLOR</a:t>
-              </a:r>
-            </a:p>
-          </p:txBody>
-        </p:sp>
-      </p:grpSp>
       <p:sp>
         <p:nvSpPr>
           <p:cNvPr id="12" name="Rectangle 11"/>
@@ -5387,7 +5300,7 @@
         </p:nvSpPr>
         <p:spPr>
           <a:xfrm>
-            <a:off x="3671270" y="1130962"/>
+            <a:off x="1110259" y="1064568"/>
             <a:ext cx="1783556" cy="684641"/>
           </a:xfrm>
           <a:prstGeom prst="rect">
@@ -5436,122 +5349,13 @@
       </p:sp>
       <p:sp>
         <p:nvSpPr>
-          <p:cNvPr id="87" name="Rectangle 86"/>
-          <p:cNvSpPr/>
-          <p:nvPr/>
-        </p:nvSpPr>
-        <p:spPr>
-          <a:xfrm>
-            <a:off x="346050" y="2237187"/>
-            <a:ext cx="895357" cy="577933"/>
-          </a:xfrm>
-          <a:prstGeom prst="rect">
-            <a:avLst/>
-          </a:prstGeom>
-          <a:solidFill>
-            <a:schemeClr val="accent2"/>
-          </a:solidFill>
-          <a:ln>
-            <a:noFill/>
-          </a:ln>
-          <a:effectLst/>
-        </p:spPr>
-        <p:style>
-          <a:lnRef idx="1">
-            <a:schemeClr val="accent1"/>
-          </a:lnRef>
-          <a:fillRef idx="3">
-            <a:schemeClr val="accent1"/>
-          </a:fillRef>
-          <a:effectRef idx="2">
-            <a:schemeClr val="accent1"/>
-          </a:effectRef>
-          <a:fontRef idx="minor">
-            <a:schemeClr val="lt1"/>
-          </a:fontRef>
-        </p:style>
-        <p:txBody>
-          <a:bodyPr lIns="68580" tIns="68580" rIns="68580" bIns="68580" rtlCol="0" anchor="ctr" anchorCtr="0"/>
-          <a:lstStyle/>
-          <a:p>
-            <a:pPr algn="ctr">
-              <a:lnSpc>
-                <a:spcPct val="90000"/>
-              </a:lnSpc>
-            </a:pPr>
-            <a:r>
-              <a:rPr lang="en-US" sz="1000" dirty="0">
-                <a:latin typeface="Trebuchet MS"/>
-                <a:cs typeface="Trebuchet MS"/>
-              </a:rPr>
-              <a:t>Solution architect group</a:t>
-            </a:r>
-          </a:p>
-        </p:txBody>
-      </p:sp>
-      <p:sp>
-        <p:nvSpPr>
-          <p:cNvPr id="88" name="Rectangle 87"/>
-          <p:cNvSpPr/>
-          <p:nvPr/>
-        </p:nvSpPr>
-        <p:spPr>
-          <a:xfrm>
-            <a:off x="2220996" y="2237187"/>
-            <a:ext cx="895357" cy="577933"/>
-          </a:xfrm>
-          <a:prstGeom prst="rect">
-            <a:avLst/>
-          </a:prstGeom>
-          <a:solidFill>
-            <a:schemeClr val="accent2"/>
-          </a:solidFill>
-          <a:ln>
-            <a:noFill/>
-          </a:ln>
-          <a:effectLst/>
-        </p:spPr>
-        <p:style>
-          <a:lnRef idx="1">
-            <a:schemeClr val="accent1"/>
-          </a:lnRef>
-          <a:fillRef idx="3">
-            <a:schemeClr val="accent1"/>
-          </a:fillRef>
-          <a:effectRef idx="2">
-            <a:schemeClr val="accent1"/>
-          </a:effectRef>
-          <a:fontRef idx="minor">
-            <a:schemeClr val="lt1"/>
-          </a:fontRef>
-        </p:style>
-        <p:txBody>
-          <a:bodyPr lIns="68580" tIns="68580" rIns="68580" bIns="68580" rtlCol="0" anchor="ctr" anchorCtr="1"/>
-          <a:lstStyle/>
-          <a:p>
-            <a:pPr algn="ctr">
-              <a:lnSpc>
-                <a:spcPct val="90000"/>
-              </a:lnSpc>
-            </a:pPr>
-            <a:r>
-              <a:rPr lang="en-US" sz="1000" dirty="0">
-                <a:cs typeface="Trebuchet MS"/>
-              </a:rPr>
-              <a:t>QA group</a:t>
-            </a:r>
-          </a:p>
-        </p:txBody>
-      </p:sp>
-      <p:sp>
-        <p:nvSpPr>
           <p:cNvPr id="89" name="Rectangle 88"/>
           <p:cNvSpPr/>
           <p:nvPr/>
         </p:nvSpPr>
         <p:spPr>
           <a:xfrm>
-            <a:off x="4115370" y="2224599"/>
+            <a:off x="214902" y="1849621"/>
             <a:ext cx="895357" cy="577933"/>
           </a:xfrm>
           <a:prstGeom prst="rect">
@@ -5589,23 +5393,20 @@
               </a:lnSpc>
             </a:pPr>
             <a:r>
-              <a:rPr lang="en-US" sz="1000" dirty="0">
+              <a:rPr lang="en-US" sz="1000" dirty="0" err="1" smtClean="0">
                 <a:cs typeface="Trebuchet MS"/>
               </a:rPr>
-              <a:t>3</a:t>
-            </a:r>
-            <a:r>
-              <a:rPr lang="en-US" sz="1000" baseline="30000" dirty="0">
+              <a:t>Travix</a:t>
+            </a:r>
+            <a:r>
+              <a:rPr lang="en-US" sz="1000" dirty="0" smtClean="0">
                 <a:cs typeface="Trebuchet MS"/>
               </a:rPr>
-              <a:t>rd</a:t>
-            </a:r>
-            <a:r>
-              <a:rPr lang="en-US" sz="1000" dirty="0">
-                <a:cs typeface="Trebuchet MS"/>
-              </a:rPr>
-              <a:t> party vendor developers</a:t>
-            </a:r>
+              <a:t> developers</a:t>
+            </a:r>
+            <a:endParaRPr lang="en-US" sz="1000" dirty="0">
+              <a:cs typeface="Trebuchet MS"/>
+            </a:endParaRPr>
           </a:p>
         </p:txBody>
       </p:sp>
@@ -5617,7 +5418,7 @@
         </p:nvSpPr>
         <p:spPr>
           <a:xfrm>
-            <a:off x="5976837" y="2237187"/>
+            <a:off x="2344937" y="1849620"/>
             <a:ext cx="895357" cy="577933"/>
           </a:xfrm>
           <a:prstGeom prst="rect">
@@ -5671,7 +5472,7 @@
         </p:nvSpPr>
         <p:spPr>
           <a:xfrm>
-            <a:off x="7837352" y="2223067"/>
+            <a:off x="214900" y="3288692"/>
             <a:ext cx="895357" cy="577933"/>
           </a:xfrm>
           <a:prstGeom prst="rect">
@@ -5719,121 +5520,13 @@
       </p:sp>
       <p:sp>
         <p:nvSpPr>
-          <p:cNvPr id="96" name="Rectangle 95"/>
-          <p:cNvSpPr/>
-          <p:nvPr/>
-        </p:nvSpPr>
-        <p:spPr>
-          <a:xfrm>
-            <a:off x="346050" y="2931691"/>
-            <a:ext cx="895357" cy="577933"/>
-          </a:xfrm>
-          <a:prstGeom prst="rect">
-            <a:avLst/>
-          </a:prstGeom>
-          <a:solidFill>
-            <a:schemeClr val="accent2"/>
-          </a:solidFill>
-          <a:ln>
-            <a:noFill/>
-          </a:ln>
-          <a:effectLst/>
-        </p:spPr>
-        <p:style>
-          <a:lnRef idx="1">
-            <a:schemeClr val="accent1"/>
-          </a:lnRef>
-          <a:fillRef idx="3">
-            <a:schemeClr val="accent1"/>
-          </a:fillRef>
-          <a:effectRef idx="2">
-            <a:schemeClr val="accent1"/>
-          </a:effectRef>
-          <a:fontRef idx="minor">
-            <a:schemeClr val="lt1"/>
-          </a:fontRef>
-        </p:style>
-        <p:txBody>
-          <a:bodyPr lIns="68580" tIns="20574" rIns="68580" bIns="68580" rtlCol="0" anchor="ctr" anchorCtr="1"/>
-          <a:lstStyle/>
-          <a:p>
-            <a:pPr algn="ctr">
-              <a:lnSpc>
-                <a:spcPct val="90000"/>
-              </a:lnSpc>
-            </a:pPr>
-            <a:r>
-              <a:rPr lang="en-US" sz="1000" dirty="0">
-                <a:cs typeface="Trebuchet MS"/>
-              </a:rPr>
-              <a:t>SA 1</a:t>
-            </a:r>
-          </a:p>
-        </p:txBody>
-      </p:sp>
-      <p:sp>
-        <p:nvSpPr>
-          <p:cNvPr id="97" name="Rectangle 96"/>
-          <p:cNvSpPr/>
-          <p:nvPr/>
-        </p:nvSpPr>
-        <p:spPr>
-          <a:xfrm>
-            <a:off x="2220996" y="2931691"/>
-            <a:ext cx="895357" cy="577933"/>
-          </a:xfrm>
-          <a:prstGeom prst="rect">
-            <a:avLst/>
-          </a:prstGeom>
-          <a:solidFill>
-            <a:schemeClr val="accent2"/>
-          </a:solidFill>
-          <a:ln>
-            <a:noFill/>
-          </a:ln>
-          <a:effectLst/>
-        </p:spPr>
-        <p:style>
-          <a:lnRef idx="1">
-            <a:schemeClr val="accent1"/>
-          </a:lnRef>
-          <a:fillRef idx="3">
-            <a:schemeClr val="accent1"/>
-          </a:fillRef>
-          <a:effectRef idx="2">
-            <a:schemeClr val="accent1"/>
-          </a:effectRef>
-          <a:fontRef idx="minor">
-            <a:schemeClr val="lt1"/>
-          </a:fontRef>
-        </p:style>
-        <p:txBody>
-          <a:bodyPr lIns="68580" tIns="68580" rIns="68580" bIns="68580" rtlCol="0" anchor="ctr" anchorCtr="1"/>
-          <a:lstStyle/>
-          <a:p>
-            <a:pPr algn="ctr">
-              <a:lnSpc>
-                <a:spcPct val="90000"/>
-              </a:lnSpc>
-            </a:pPr>
-            <a:r>
-              <a:rPr lang="en-US" sz="1000" dirty="0">
-                <a:cs typeface="Trebuchet MS"/>
-              </a:rPr>
-              <a:t>Lead QA</a:t>
-            </a:r>
-          </a:p>
-        </p:txBody>
-      </p:sp>
-      <p:sp>
-        <p:nvSpPr>
           <p:cNvPr id="98" name="Rectangle 97"/>
           <p:cNvSpPr/>
           <p:nvPr/>
         </p:nvSpPr>
         <p:spPr>
           <a:xfrm>
-            <a:off x="4115370" y="2919104"/>
+            <a:off x="214900" y="2610347"/>
             <a:ext cx="895357" cy="577933"/>
           </a:xfrm>
           <a:prstGeom prst="rect">
@@ -5871,11 +5564,20 @@
               </a:lnSpc>
             </a:pPr>
             <a:r>
-              <a:rPr lang="en-US" sz="1000" dirty="0">
+              <a:rPr lang="en-US" sz="1000" dirty="0" err="1" smtClean="0">
                 <a:cs typeface="Trebuchet MS"/>
               </a:rPr>
-              <a:t>Developer</a:t>
-            </a:r>
+              <a:t>Epam</a:t>
+            </a:r>
+            <a:r>
+              <a:rPr lang="en-US" sz="1000" dirty="0" smtClean="0">
+                <a:cs typeface="Trebuchet MS"/>
+              </a:rPr>
+              <a:t> developers</a:t>
+            </a:r>
+            <a:endParaRPr lang="en-US" sz="1000" dirty="0">
+              <a:cs typeface="Trebuchet MS"/>
+            </a:endParaRPr>
           </a:p>
         </p:txBody>
       </p:sp>
@@ -5887,7 +5589,7 @@
         </p:nvSpPr>
         <p:spPr>
           <a:xfrm>
-            <a:off x="5976837" y="2921530"/>
+            <a:off x="2344938" y="2608971"/>
             <a:ext cx="895357" cy="577933"/>
           </a:xfrm>
           <a:prstGeom prst="rect">
@@ -5929,114 +5631,6 @@
                 <a:cs typeface="Trebuchet MS"/>
               </a:rPr>
               <a:t>Important manager</a:t>
-            </a:r>
-          </a:p>
-        </p:txBody>
-      </p:sp>
-      <p:sp>
-        <p:nvSpPr>
-          <p:cNvPr id="101" name="Rectangle 100"/>
-          <p:cNvSpPr/>
-          <p:nvPr/>
-        </p:nvSpPr>
-        <p:spPr>
-          <a:xfrm>
-            <a:off x="346050" y="3626195"/>
-            <a:ext cx="895357" cy="577933"/>
-          </a:xfrm>
-          <a:prstGeom prst="rect">
-            <a:avLst/>
-          </a:prstGeom>
-          <a:solidFill>
-            <a:schemeClr val="accent2"/>
-          </a:solidFill>
-          <a:ln>
-            <a:noFill/>
-          </a:ln>
-          <a:effectLst/>
-        </p:spPr>
-        <p:style>
-          <a:lnRef idx="1">
-            <a:schemeClr val="accent1"/>
-          </a:lnRef>
-          <a:fillRef idx="3">
-            <a:schemeClr val="accent1"/>
-          </a:fillRef>
-          <a:effectRef idx="2">
-            <a:schemeClr val="accent1"/>
-          </a:effectRef>
-          <a:fontRef idx="minor">
-            <a:schemeClr val="lt1"/>
-          </a:fontRef>
-        </p:style>
-        <p:txBody>
-          <a:bodyPr lIns="68580" tIns="27432" rIns="68580" bIns="68580" rtlCol="0" anchor="ctr" anchorCtr="1"/>
-          <a:lstStyle/>
-          <a:p>
-            <a:pPr algn="ctr">
-              <a:lnSpc>
-                <a:spcPct val="90000"/>
-              </a:lnSpc>
-            </a:pPr>
-            <a:r>
-              <a:rPr lang="en-US" sz="1000" dirty="0">
-                <a:cs typeface="Trebuchet MS"/>
-              </a:rPr>
-              <a:t>DM 1</a:t>
-            </a:r>
-          </a:p>
-        </p:txBody>
-      </p:sp>
-      <p:sp>
-        <p:nvSpPr>
-          <p:cNvPr id="102" name="Rectangle 101"/>
-          <p:cNvSpPr/>
-          <p:nvPr/>
-        </p:nvSpPr>
-        <p:spPr>
-          <a:xfrm>
-            <a:off x="2220996" y="3626195"/>
-            <a:ext cx="895357" cy="577933"/>
-          </a:xfrm>
-          <a:prstGeom prst="rect">
-            <a:avLst/>
-          </a:prstGeom>
-          <a:solidFill>
-            <a:schemeClr val="accent2"/>
-          </a:solidFill>
-          <a:ln>
-            <a:noFill/>
-          </a:ln>
-          <a:effectLst/>
-        </p:spPr>
-        <p:style>
-          <a:lnRef idx="1">
-            <a:schemeClr val="accent1"/>
-          </a:lnRef>
-          <a:fillRef idx="3">
-            <a:schemeClr val="accent1"/>
-          </a:fillRef>
-          <a:effectRef idx="2">
-            <a:schemeClr val="accent1"/>
-          </a:effectRef>
-          <a:fontRef idx="minor">
-            <a:schemeClr val="lt1"/>
-          </a:fontRef>
-        </p:style>
-        <p:txBody>
-          <a:bodyPr lIns="68580" tIns="27432" rIns="68580" bIns="68580" rtlCol="0" anchor="ctr" anchorCtr="1"/>
-          <a:lstStyle/>
-          <a:p>
-            <a:pPr algn="ctr">
-              <a:lnSpc>
-                <a:spcPct val="90000"/>
-              </a:lnSpc>
-            </a:pPr>
-            <a:r>
-              <a:rPr lang="en-US" sz="1000" dirty="0">
-                <a:cs typeface="Trebuchet MS"/>
-              </a:rPr>
-              <a:t>QA</a:t>
             </a:r>
           </a:p>
         </p:txBody>
@@ -6077,38 +5671,405 @@
           </a:fontRef>
         </p:style>
       </p:cxnSp>
+      <p:sp>
+        <p:nvSpPr>
+          <p:cNvPr id="6" name="Text Placeholder 5"/>
+          <p:cNvSpPr>
+            <a:spLocks noGrp="1"/>
+          </p:cNvSpPr>
+          <p:nvPr>
+            <p:ph type="body" sz="quarter" idx="10"/>
+          </p:nvPr>
+        </p:nvSpPr>
+        <p:spPr/>
+        <p:txBody>
+          <a:bodyPr/>
+          <a:lstStyle/>
+          <a:p>
+            <a:r>
+              <a:rPr lang="en-US" dirty="0"/>
+              <a:t>My team</a:t>
+            </a:r>
+          </a:p>
+        </p:txBody>
+      </p:sp>
+      <p:sp>
+        <p:nvSpPr>
+          <p:cNvPr id="40" name="Rectangle 89"/>
+          <p:cNvSpPr/>
+          <p:nvPr/>
+        </p:nvSpPr>
+        <p:spPr>
+          <a:xfrm>
+            <a:off x="2344937" y="3288692"/>
+            <a:ext cx="895357" cy="577933"/>
+          </a:xfrm>
+          <a:prstGeom prst="rect">
+            <a:avLst/>
+          </a:prstGeom>
+          <a:solidFill>
+            <a:schemeClr val="accent4"/>
+          </a:solidFill>
+          <a:ln>
+            <a:noFill/>
+          </a:ln>
+          <a:effectLst/>
+        </p:spPr>
+        <p:style>
+          <a:lnRef idx="1">
+            <a:schemeClr val="accent1"/>
+          </a:lnRef>
+          <a:fillRef idx="3">
+            <a:schemeClr val="accent1"/>
+          </a:fillRef>
+          <a:effectRef idx="2">
+            <a:schemeClr val="accent1"/>
+          </a:effectRef>
+          <a:fontRef idx="minor">
+            <a:schemeClr val="lt1"/>
+          </a:fontRef>
+        </p:style>
+        <p:txBody>
+          <a:bodyPr lIns="68580" tIns="27432" rIns="68580" bIns="68580" rtlCol="0" anchor="ctr" anchorCtr="1"/>
+          <a:lstStyle/>
+          <a:p>
+            <a:pPr algn="ctr">
+              <a:lnSpc>
+                <a:spcPct val="90000"/>
+              </a:lnSpc>
+            </a:pPr>
+            <a:r>
+              <a:rPr lang="en-US" sz="1000" dirty="0" smtClean="0">
+                <a:cs typeface="Trebuchet MS"/>
+              </a:rPr>
+              <a:t>Scrum Master</a:t>
+            </a:r>
+            <a:endParaRPr lang="en-US" sz="1000" dirty="0">
+              <a:cs typeface="Trebuchet MS"/>
+            </a:endParaRPr>
+          </a:p>
+        </p:txBody>
+      </p:sp>
+      <p:sp>
+        <p:nvSpPr>
+          <p:cNvPr id="2" name="TextBox 1"/>
+          <p:cNvSpPr txBox="1"/>
+          <p:nvPr/>
+        </p:nvSpPr>
+        <p:spPr>
+          <a:xfrm>
+            <a:off x="4063283" y="1456426"/>
+            <a:ext cx="3380705" cy="954107"/>
+          </a:xfrm>
+          <a:prstGeom prst="rect">
+            <a:avLst/>
+          </a:prstGeom>
+          <a:noFill/>
+        </p:spPr>
+        <p:txBody>
+          <a:bodyPr wrap="square" rtlCol="0">
+            <a:spAutoFit/>
+          </a:bodyPr>
+          <a:lstStyle/>
+          <a:p>
+            <a:r>
+              <a:rPr lang="en-US" dirty="0" smtClean="0"/>
+              <a:t>There are no QAs in the project. Testing is been processed by Unit tests and automation tests – provided and supported by developers.</a:t>
+            </a:r>
+            <a:endParaRPr lang="en-US" dirty="0"/>
+          </a:p>
+        </p:txBody>
+      </p:sp>
+      <p:sp>
+        <p:nvSpPr>
+          <p:cNvPr id="13" name="Rectangle 97"/>
+          <p:cNvSpPr/>
+          <p:nvPr/>
+        </p:nvSpPr>
+        <p:spPr>
+          <a:xfrm>
+            <a:off x="1264530" y="2613322"/>
+            <a:ext cx="895357" cy="577933"/>
+          </a:xfrm>
+          <a:prstGeom prst="rect">
+            <a:avLst/>
+          </a:prstGeom>
+          <a:solidFill>
+            <a:schemeClr val="accent2"/>
+          </a:solidFill>
+          <a:ln>
+            <a:noFill/>
+          </a:ln>
+          <a:effectLst/>
+        </p:spPr>
+        <p:style>
+          <a:lnRef idx="1">
+            <a:schemeClr val="accent1"/>
+          </a:lnRef>
+          <a:fillRef idx="3">
+            <a:schemeClr val="accent1"/>
+          </a:fillRef>
+          <a:effectRef idx="2">
+            <a:schemeClr val="accent1"/>
+          </a:effectRef>
+          <a:fontRef idx="minor">
+            <a:schemeClr val="lt1"/>
+          </a:fontRef>
+        </p:style>
+        <p:txBody>
+          <a:bodyPr lIns="68580" tIns="27432" rIns="68580" bIns="68580" rtlCol="0" anchor="ctr" anchorCtr="1"/>
+          <a:lstStyle/>
+          <a:p>
+            <a:pPr algn="ctr">
+              <a:lnSpc>
+                <a:spcPct val="90000"/>
+              </a:lnSpc>
+            </a:pPr>
+            <a:r>
+              <a:rPr lang="en-US" sz="1000" dirty="0" smtClean="0">
+                <a:cs typeface="Trebuchet MS"/>
+              </a:rPr>
+              <a:t>Dev Ops</a:t>
+            </a:r>
+            <a:endParaRPr lang="en-US" sz="1000" dirty="0">
+              <a:cs typeface="Trebuchet MS"/>
+            </a:endParaRPr>
+          </a:p>
+        </p:txBody>
+      </p:sp>
+    </p:spTree>
+    <p:extLst>
+      <p:ext uri="{BB962C8B-B14F-4D97-AF65-F5344CB8AC3E}">
+        <p14:creationId xmlns:p14="http://schemas.microsoft.com/office/powerpoint/2010/main" val="480573351"/>
+      </p:ext>
+    </p:extLst>
+  </p:cSld>
+  <p:clrMapOvr>
+    <a:masterClrMapping/>
+  </p:clrMapOvr>
+  <p:timing>
+    <p:tnLst>
+      <p:par>
+        <p:cTn id="1" dur="indefinite" restart="never" nodeType="tmRoot"/>
+      </p:par>
+    </p:tnLst>
+  </p:timing>
+</p:sld>
+</file>
+
+<file path=ppt/slides/slide5.xml><?xml version="1.0" encoding="utf-8"?>
+<p:sld xmlns:a="http://schemas.openxmlformats.org/drawingml/2006/main" xmlns:r="http://schemas.openxmlformats.org/officeDocument/2006/relationships" xmlns:p="http://schemas.openxmlformats.org/presentationml/2006/main">
+  <p:cSld>
+    <p:spTree>
+      <p:nvGrpSpPr>
+        <p:cNvPr id="1" name=""/>
+        <p:cNvGrpSpPr/>
+        <p:nvPr/>
+      </p:nvGrpSpPr>
+      <p:grpSpPr>
+        <a:xfrm>
+          <a:off x="0" y="0"/>
+          <a:ext cx="0" cy="0"/>
+          <a:chOff x="0" y="0"/>
+          <a:chExt cx="0" cy="0"/>
+        </a:xfrm>
+      </p:grpSpPr>
+      <p:sp>
+        <p:nvSpPr>
+          <p:cNvPr id="4" name="Content Placeholder 3"/>
+          <p:cNvSpPr>
+            <a:spLocks noGrp="1"/>
+          </p:cNvSpPr>
+          <p:nvPr>
+            <p:ph idx="1"/>
+          </p:nvPr>
+        </p:nvSpPr>
+        <p:spPr>
+          <a:xfrm>
+            <a:off x="375507" y="978724"/>
+            <a:ext cx="3810584" cy="3383280"/>
+          </a:xfrm>
+        </p:spPr>
+        <p:txBody>
+          <a:bodyPr>
+            <a:noAutofit/>
+          </a:bodyPr>
+          <a:lstStyle/>
+          <a:p>
+            <a:pPr marL="0" indent="0">
+              <a:spcBef>
+                <a:spcPts val="600"/>
+              </a:spcBef>
+              <a:spcAft>
+                <a:spcPts val="600"/>
+              </a:spcAft>
+              <a:buNone/>
+            </a:pPr>
+            <a:r>
+              <a:rPr lang="en-US" sz="1100" b="1" dirty="0"/>
+              <a:t>I’ve developed </a:t>
+            </a:r>
+            <a:r>
+              <a:rPr lang="en-US" sz="1100" b="1" dirty="0" smtClean="0"/>
+              <a:t>integration with </a:t>
+            </a:r>
+            <a:r>
+              <a:rPr lang="en-US" sz="1100" b="1" dirty="0" err="1" smtClean="0"/>
+              <a:t>FreshDesk</a:t>
+            </a:r>
+            <a:r>
+              <a:rPr lang="en-US" sz="1100" b="1" dirty="0" smtClean="0"/>
+              <a:t> 3</a:t>
+            </a:r>
+            <a:r>
+              <a:rPr lang="en-US" sz="1100" b="1" baseline="30000" dirty="0" smtClean="0"/>
+              <a:t>rd</a:t>
+            </a:r>
+            <a:r>
+              <a:rPr lang="en-US" sz="1100" b="1" dirty="0" smtClean="0"/>
+              <a:t> party application(highlighted </a:t>
+            </a:r>
+            <a:r>
+              <a:rPr lang="en-US" sz="1100" b="1" dirty="0"/>
+              <a:t>in blue).  </a:t>
+            </a:r>
+            <a:r>
+              <a:rPr lang="en-US" sz="1100" dirty="0"/>
+              <a:t>Including: </a:t>
+            </a:r>
+          </a:p>
+          <a:p>
+            <a:pPr>
+              <a:spcBef>
+                <a:spcPts val="600"/>
+              </a:spcBef>
+              <a:spcAft>
+                <a:spcPts val="600"/>
+              </a:spcAft>
+              <a:buFont typeface="Arial" panose="020B0604020202020204" pitchFamily="34" charset="0"/>
+              <a:buChar char="•"/>
+            </a:pPr>
+            <a:r>
+              <a:rPr lang="en-US" sz="1100" dirty="0" smtClean="0"/>
+              <a:t>Integration with </a:t>
+            </a:r>
+            <a:r>
+              <a:rPr lang="en-US" sz="1100" dirty="0" err="1" smtClean="0"/>
+              <a:t>FreshDesk</a:t>
+            </a:r>
+            <a:r>
+              <a:rPr lang="en-US" sz="1100" dirty="0" smtClean="0"/>
+              <a:t> application upon changing/cancellation of flights/tickets</a:t>
+            </a:r>
+            <a:endParaRPr lang="en-US" sz="1100" dirty="0"/>
+          </a:p>
+          <a:p>
+            <a:pPr>
+              <a:spcBef>
+                <a:spcPts val="600"/>
+              </a:spcBef>
+              <a:spcAft>
+                <a:spcPts val="600"/>
+              </a:spcAft>
+              <a:buFont typeface="Arial" panose="020B0604020202020204" pitchFamily="34" charset="0"/>
+              <a:buChar char="•"/>
+            </a:pPr>
+            <a:r>
+              <a:rPr lang="en-US" sz="1100" dirty="0" smtClean="0"/>
+              <a:t>Preparation of data, error handling, pushing/getting of data.</a:t>
+            </a:r>
+            <a:endParaRPr lang="en-US" sz="1100" dirty="0"/>
+          </a:p>
+          <a:p>
+            <a:pPr marL="0" indent="0">
+              <a:spcBef>
+                <a:spcPts val="600"/>
+              </a:spcBef>
+              <a:spcAft>
+                <a:spcPts val="600"/>
+              </a:spcAft>
+              <a:buNone/>
+            </a:pPr>
+            <a:r>
+              <a:rPr lang="en-US" sz="1100" b="1" dirty="0"/>
+              <a:t>As the result: </a:t>
+            </a:r>
+          </a:p>
+          <a:p>
+            <a:pPr marL="0" indent="0">
+              <a:spcBef>
+                <a:spcPts val="600"/>
+              </a:spcBef>
+              <a:spcAft>
+                <a:spcPts val="600"/>
+              </a:spcAft>
+              <a:buNone/>
+            </a:pPr>
+            <a:r>
+              <a:rPr lang="en-US" sz="1100" dirty="0"/>
+              <a:t>We achieved &lt;your achievements&gt;.</a:t>
+            </a:r>
+          </a:p>
+        </p:txBody>
+      </p:sp>
+      <p:sp>
+        <p:nvSpPr>
+          <p:cNvPr id="19" name="Text Placeholder 18"/>
+          <p:cNvSpPr>
+            <a:spLocks noGrp="1"/>
+          </p:cNvSpPr>
+          <p:nvPr>
+            <p:ph type="body" sz="quarter" idx="10"/>
+          </p:nvPr>
+        </p:nvSpPr>
+        <p:spPr/>
+        <p:txBody>
+          <a:bodyPr/>
+          <a:lstStyle/>
+          <a:p>
+            <a:r>
+              <a:rPr lang="en-US" dirty="0"/>
+              <a:t>My project architecture</a:t>
+            </a:r>
+          </a:p>
+        </p:txBody>
+      </p:sp>
       <p:grpSp>
         <p:nvGrpSpPr>
-          <p:cNvPr id="4" name="Group 3"/>
+          <p:cNvPr id="2" name="Group 1"/>
           <p:cNvGrpSpPr/>
           <p:nvPr/>
         </p:nvGrpSpPr>
         <p:grpSpPr>
           <a:xfrm>
-            <a:off x="778669" y="1952625"/>
-            <a:ext cx="7522369" cy="205740"/>
-            <a:chOff x="1397000" y="2603500"/>
-            <a:chExt cx="6343650" cy="274320"/>
+            <a:off x="5055157" y="978724"/>
+            <a:ext cx="2616614" cy="3560671"/>
+            <a:chOff x="6092826" y="1308101"/>
+            <a:chExt cx="2745061" cy="3735459"/>
           </a:xfrm>
         </p:grpSpPr>
         <p:cxnSp>
           <p:nvCxnSpPr>
-            <p:cNvPr id="8" name="Straight Connector 7"/>
+            <p:cNvPr id="35" name="Straight Arrow Connector 34"/>
             <p:cNvCxnSpPr/>
             <p:nvPr/>
           </p:nvCxnSpPr>
           <p:spPr>
             <a:xfrm>
-              <a:off x="1397000" y="2605291"/>
-              <a:ext cx="6343650" cy="0"/>
+              <a:off x="7465355" y="4354369"/>
+              <a:ext cx="0" cy="301336"/>
             </a:xfrm>
-            <a:prstGeom prst="line">
+            <a:prstGeom prst="straightConnector1">
               <a:avLst/>
             </a:prstGeom>
-            <a:ln w="28575" cmpd="sng">
+            <a:ln w="28575" cap="flat" cmpd="sng">
               <a:solidFill>
-                <a:schemeClr val="accent1"/>
+                <a:schemeClr val="accent2"/>
               </a:solidFill>
+              <a:prstDash val="solid"/>
+              <a:round/>
+              <a:headEnd type="triangle" w="lg" len="med"/>
+              <a:tailEnd type="triangle" w="lg" len="med"/>
             </a:ln>
             <a:effectLst/>
           </p:spPr>
@@ -6129,24 +6090,26 @@
         </p:cxnSp>
         <p:cxnSp>
           <p:nvCxnSpPr>
-            <p:cNvPr id="28" name="Straight Connector 27"/>
+            <p:cNvPr id="37" name="Straight Arrow Connector 36"/>
             <p:cNvCxnSpPr/>
             <p:nvPr/>
           </p:nvCxnSpPr>
           <p:spPr>
             <a:xfrm>
-              <a:off x="2990851" y="2603500"/>
-              <a:ext cx="0" cy="274320"/>
+              <a:off x="7465355" y="1422400"/>
+              <a:ext cx="0" cy="301336"/>
             </a:xfrm>
-            <a:prstGeom prst="line">
+            <a:prstGeom prst="straightConnector1">
               <a:avLst/>
             </a:prstGeom>
-            <a:ln w="28575" cmpd="sng">
+            <a:ln w="28575" cap="flat" cmpd="sng">
               <a:solidFill>
-                <a:schemeClr val="accent1"/>
+                <a:schemeClr val="accent4"/>
               </a:solidFill>
-              <a:headEnd type="none"/>
-              <a:tailEnd type="arrow" w="lg" len="sm"/>
+              <a:prstDash val="solid"/>
+              <a:round/>
+              <a:headEnd type="triangle" w="lg" len="med"/>
+              <a:tailEnd type="triangle" w="lg" len="med"/>
             </a:ln>
             <a:effectLst/>
           </p:spPr>
@@ -6165,214 +6128,30 @@
             </a:fontRef>
           </p:style>
         </p:cxnSp>
-        <p:cxnSp>
-          <p:nvCxnSpPr>
-            <p:cNvPr id="29" name="Straight Connector 28"/>
-            <p:cNvCxnSpPr/>
-            <p:nvPr/>
-          </p:nvCxnSpPr>
-          <p:spPr>
-            <a:xfrm>
-              <a:off x="1409700" y="2603500"/>
-              <a:ext cx="1" cy="274320"/>
-            </a:xfrm>
-            <a:prstGeom prst="line">
-              <a:avLst/>
-            </a:prstGeom>
-            <a:ln w="28575" cmpd="sng">
-              <a:solidFill>
-                <a:schemeClr val="accent1"/>
-              </a:solidFill>
-              <a:headEnd type="none"/>
-              <a:tailEnd type="arrow" w="lg" len="sm"/>
-            </a:ln>
-            <a:effectLst/>
-          </p:spPr>
-          <p:style>
-            <a:lnRef idx="2">
-              <a:schemeClr val="accent1"/>
-            </a:lnRef>
-            <a:fillRef idx="0">
-              <a:schemeClr val="accent1"/>
-            </a:fillRef>
-            <a:effectRef idx="1">
-              <a:schemeClr val="accent1"/>
-            </a:effectRef>
-            <a:fontRef idx="minor">
-              <a:schemeClr val="tx1"/>
-            </a:fontRef>
-          </p:style>
-        </p:cxnSp>
-        <p:cxnSp>
-          <p:nvCxnSpPr>
-            <p:cNvPr id="36" name="Straight Connector 35"/>
-            <p:cNvCxnSpPr/>
-            <p:nvPr/>
-          </p:nvCxnSpPr>
-          <p:spPr>
-            <a:xfrm>
-              <a:off x="6148783" y="2603500"/>
-              <a:ext cx="1" cy="274320"/>
-            </a:xfrm>
-            <a:prstGeom prst="line">
-              <a:avLst/>
-            </a:prstGeom>
-            <a:ln w="28575" cmpd="sng">
-              <a:solidFill>
-                <a:schemeClr val="accent1"/>
-              </a:solidFill>
-              <a:headEnd type="none"/>
-              <a:tailEnd type="arrow" w="lg" len="sm"/>
-            </a:ln>
-            <a:effectLst/>
-          </p:spPr>
-          <p:style>
-            <a:lnRef idx="2">
-              <a:schemeClr val="accent1"/>
-            </a:lnRef>
-            <a:fillRef idx="0">
-              <a:schemeClr val="accent1"/>
-            </a:fillRef>
-            <a:effectRef idx="1">
-              <a:schemeClr val="accent1"/>
-            </a:effectRef>
-            <a:fontRef idx="minor">
-              <a:schemeClr val="tx1"/>
-            </a:fontRef>
-          </p:style>
-        </p:cxnSp>
-        <p:cxnSp>
-          <p:nvCxnSpPr>
-            <p:cNvPr id="37" name="Straight Connector 36"/>
-            <p:cNvCxnSpPr/>
-            <p:nvPr/>
-          </p:nvCxnSpPr>
-          <p:spPr>
-            <a:xfrm>
-              <a:off x="7727151" y="2603500"/>
-              <a:ext cx="1" cy="274320"/>
-            </a:xfrm>
-            <a:prstGeom prst="line">
-              <a:avLst/>
-            </a:prstGeom>
-            <a:ln w="28575" cmpd="sng">
-              <a:solidFill>
-                <a:schemeClr val="accent1"/>
-              </a:solidFill>
-              <a:headEnd type="none"/>
-              <a:tailEnd type="arrow" w="lg" len="sm"/>
-            </a:ln>
-            <a:effectLst/>
-          </p:spPr>
-          <p:style>
-            <a:lnRef idx="2">
-              <a:schemeClr val="accent1"/>
-            </a:lnRef>
-            <a:fillRef idx="0">
-              <a:schemeClr val="accent1"/>
-            </a:fillRef>
-            <a:effectRef idx="1">
-              <a:schemeClr val="accent1"/>
-            </a:effectRef>
-            <a:fontRef idx="minor">
-              <a:schemeClr val="tx1"/>
-            </a:fontRef>
-          </p:style>
-        </p:cxnSp>
-        <p:cxnSp>
-          <p:nvCxnSpPr>
-            <p:cNvPr id="38" name="Straight Connector 37"/>
-            <p:cNvCxnSpPr/>
-            <p:nvPr/>
-          </p:nvCxnSpPr>
-          <p:spPr>
-            <a:xfrm>
-              <a:off x="4572000" y="2603500"/>
-              <a:ext cx="0" cy="274320"/>
-            </a:xfrm>
-            <a:prstGeom prst="line">
-              <a:avLst/>
-            </a:prstGeom>
-            <a:ln w="28575" cmpd="sng">
-              <a:solidFill>
-                <a:srgbClr val="CCCCCC"/>
-              </a:solidFill>
-              <a:headEnd type="none"/>
-              <a:tailEnd type="arrow" w="lg" len="sm"/>
-            </a:ln>
-            <a:effectLst/>
-          </p:spPr>
-          <p:style>
-            <a:lnRef idx="2">
-              <a:schemeClr val="accent1"/>
-            </a:lnRef>
-            <a:fillRef idx="0">
-              <a:schemeClr val="accent1"/>
-            </a:fillRef>
-            <a:effectRef idx="1">
-              <a:schemeClr val="accent1"/>
-            </a:effectRef>
-            <a:fontRef idx="minor">
-              <a:schemeClr val="tx1"/>
-            </a:fontRef>
-          </p:style>
-        </p:cxnSp>
-      </p:grpSp>
-      <p:sp>
-        <p:nvSpPr>
-          <p:cNvPr id="6" name="Text Placeholder 5"/>
-          <p:cNvSpPr>
-            <a:spLocks noGrp="1"/>
-          </p:cNvSpPr>
-          <p:nvPr>
-            <p:ph type="body" sz="quarter" idx="10"/>
-          </p:nvPr>
-        </p:nvSpPr>
-        <p:spPr/>
-        <p:txBody>
-          <a:bodyPr/>
-          <a:lstStyle/>
-          <a:p>
-            <a:r>
-              <a:rPr lang="en-US" dirty="0"/>
-              <a:t>My team</a:t>
-            </a:r>
-          </a:p>
-        </p:txBody>
-      </p:sp>
-      <p:grpSp>
-        <p:nvGrpSpPr>
-          <p:cNvPr id="13" name="Group 12"/>
-          <p:cNvGrpSpPr/>
-          <p:nvPr/>
-        </p:nvGrpSpPr>
-        <p:grpSpPr>
-          <a:xfrm>
-            <a:off x="8280265" y="4582480"/>
-            <a:ext cx="956098" cy="176972"/>
-            <a:chOff x="7096551" y="4582480"/>
-            <a:chExt cx="956098" cy="176972"/>
-          </a:xfrm>
-        </p:grpSpPr>
         <p:sp>
           <p:nvSpPr>
-            <p:cNvPr id="30" name="Rectangle 29"/>
+            <p:cNvPr id="14" name="Rectangle 13"/>
             <p:cNvSpPr/>
             <p:nvPr/>
           </p:nvSpPr>
           <p:spPr>
             <a:xfrm>
-              <a:off x="7096551" y="4600462"/>
-              <a:ext cx="137160" cy="137160"/>
+              <a:off x="6092826" y="1809750"/>
+              <a:ext cx="2745061" cy="2762250"/>
             </a:xfrm>
             <a:prstGeom prst="rect">
               <a:avLst/>
             </a:prstGeom>
             <a:solidFill>
-              <a:srgbClr val="B22746"/>
+              <a:schemeClr val="accent2">
+                <a:lumMod val="20000"/>
+                <a:lumOff val="80000"/>
+              </a:schemeClr>
             </a:solidFill>
-            <a:ln>
-              <a:noFill/>
+            <a:ln w="3175" cmpd="sng">
+              <a:solidFill>
+                <a:schemeClr val="accent2"/>
+              </a:solidFill>
             </a:ln>
             <a:effectLst/>
           </p:spPr>
@@ -6391,54 +6170,476 @@
             </a:fontRef>
           </p:style>
           <p:txBody>
-            <a:bodyPr lIns="68580" tIns="34290" rIns="68580" bIns="34290" rtlCol="0" anchor="ctr"/>
+            <a:bodyPr vert="horz" tIns="91440" bIns="0" rtlCol="0" anchor="t" anchorCtr="0"/>
             <a:lstStyle/>
             <a:p>
-              <a:pPr algn="ctr"/>
-              <a:endParaRPr lang="en-US" dirty="0"/>
+              <a:r>
+                <a:rPr lang="en-US" sz="600" b="1" dirty="0" smtClean="0">
+                  <a:solidFill>
+                    <a:srgbClr val="666666"/>
+                  </a:solidFill>
+                  <a:latin typeface="Arial Black"/>
+                  <a:cs typeface="Arial Black"/>
+                </a:rPr>
+                <a:t>Integration with </a:t>
+              </a:r>
+              <a:r>
+                <a:rPr lang="en-US" sz="600" b="1" dirty="0" err="1" smtClean="0">
+                  <a:solidFill>
+                    <a:srgbClr val="666666"/>
+                  </a:solidFill>
+                  <a:latin typeface="Arial Black"/>
+                  <a:cs typeface="Arial Black"/>
+                </a:rPr>
+                <a:t>FreshDesk</a:t>
+              </a:r>
+              <a:r>
+                <a:rPr lang="en-US" sz="600" b="1" dirty="0" smtClean="0">
+                  <a:solidFill>
+                    <a:srgbClr val="666666"/>
+                  </a:solidFill>
+                  <a:latin typeface="Arial Black"/>
+                  <a:cs typeface="Arial Black"/>
+                </a:rPr>
+                <a:t>(3d party </a:t>
+              </a:r>
+              <a:r>
+                <a:rPr lang="en-US" sz="600" b="1" dirty="0" err="1" smtClean="0">
+                  <a:solidFill>
+                    <a:srgbClr val="666666"/>
+                  </a:solidFill>
+                  <a:latin typeface="Arial Black"/>
+                  <a:cs typeface="Arial Black"/>
+                </a:rPr>
+                <a:t>applciation</a:t>
+              </a:r>
+              <a:r>
+                <a:rPr lang="en-US" sz="600" b="1" dirty="0" smtClean="0">
+                  <a:solidFill>
+                    <a:srgbClr val="666666"/>
+                  </a:solidFill>
+                  <a:latin typeface="Arial Black"/>
+                  <a:cs typeface="Arial Black"/>
+                </a:rPr>
+                <a:t>) </a:t>
+              </a:r>
+              <a:endParaRPr lang="en-US" sz="600" b="1" dirty="0">
+                <a:solidFill>
+                  <a:srgbClr val="666666"/>
+                </a:solidFill>
+                <a:latin typeface="Arial Black"/>
+                <a:cs typeface="Arial Black"/>
+              </a:endParaRPr>
             </a:p>
           </p:txBody>
         </p:sp>
         <p:sp>
           <p:nvSpPr>
-            <p:cNvPr id="31" name="TextBox 30"/>
-            <p:cNvSpPr txBox="1"/>
+            <p:cNvPr id="13" name="Rectangle 12"/>
+            <p:cNvSpPr/>
             <p:nvPr/>
           </p:nvSpPr>
           <p:spPr>
             <a:xfrm>
-              <a:off x="7233711" y="4582480"/>
-              <a:ext cx="818938" cy="176972"/>
+              <a:off x="6092936" y="1308101"/>
+              <a:ext cx="2744838" cy="331859"/>
             </a:xfrm>
             <a:prstGeom prst="rect">
               <a:avLst/>
             </a:prstGeom>
-            <a:noFill/>
+            <a:solidFill>
+              <a:schemeClr val="accent4">
+                <a:lumMod val="20000"/>
+                <a:lumOff val="80000"/>
+              </a:schemeClr>
+            </a:solidFill>
+            <a:ln w="3175" cmpd="sng">
+              <a:solidFill>
+                <a:schemeClr val="accent4"/>
+              </a:solidFill>
+            </a:ln>
+            <a:effectLst/>
           </p:spPr>
+          <p:style>
+            <a:lnRef idx="1">
+              <a:schemeClr val="accent1"/>
+            </a:lnRef>
+            <a:fillRef idx="3">
+              <a:schemeClr val="accent1"/>
+            </a:fillRef>
+            <a:effectRef idx="2">
+              <a:schemeClr val="accent1"/>
+            </a:effectRef>
+            <a:fontRef idx="minor">
+              <a:schemeClr val="lt1"/>
+            </a:fontRef>
+          </p:style>
           <p:txBody>
-            <a:bodyPr wrap="square" lIns="68580" tIns="34290" rIns="68580" bIns="34290" rtlCol="0">
-              <a:spAutoFit/>
-            </a:bodyPr>
+            <a:bodyPr tIns="27432" rtlCol="0" anchor="ctr"/>
             <a:lstStyle/>
             <a:p>
+              <a:pPr algn="ctr"/>
               <a:r>
-                <a:rPr lang="en-US" sz="700" dirty="0">
+                <a:rPr lang="en-US" sz="600" b="1" dirty="0" err="1" smtClean="0">
+                  <a:solidFill>
+                    <a:srgbClr val="666666"/>
+                  </a:solidFill>
+                  <a:latin typeface="Trebuchet MS"/>
+                  <a:cs typeface="Trebuchet MS"/>
+                </a:rPr>
+                <a:t>MyAccount</a:t>
+              </a:r>
+              <a:r>
+                <a:rPr lang="en-US" sz="600" b="1" dirty="0" smtClean="0">
+                  <a:solidFill>
+                    <a:srgbClr val="666666"/>
+                  </a:solidFill>
+                  <a:latin typeface="Trebuchet MS"/>
+                  <a:cs typeface="Trebuchet MS"/>
+                </a:rPr>
+                <a:t> application(UI)</a:t>
+              </a:r>
+              <a:endParaRPr lang="en-US" sz="600" b="1" dirty="0">
+                <a:solidFill>
+                  <a:srgbClr val="666666"/>
+                </a:solidFill>
+                <a:latin typeface="Trebuchet MS"/>
+                <a:cs typeface="Trebuchet MS"/>
+              </a:endParaRPr>
+            </a:p>
+          </p:txBody>
+        </p:sp>
+        <p:sp>
+          <p:nvSpPr>
+            <p:cNvPr id="16" name="Rectangle 15"/>
+            <p:cNvSpPr/>
+            <p:nvPr/>
+          </p:nvSpPr>
+          <p:spPr>
+            <a:xfrm>
+              <a:off x="6715032" y="2393810"/>
+              <a:ext cx="1253614" cy="584279"/>
+            </a:xfrm>
+            <a:prstGeom prst="rect">
+              <a:avLst/>
+            </a:prstGeom>
+            <a:solidFill>
+              <a:schemeClr val="bg1"/>
+            </a:solidFill>
+            <a:ln w="3175" cmpd="sng">
+              <a:solidFill>
+                <a:schemeClr val="accent3"/>
+              </a:solidFill>
+            </a:ln>
+            <a:effectLst/>
+          </p:spPr>
+          <p:style>
+            <a:lnRef idx="1">
+              <a:schemeClr val="accent1"/>
+            </a:lnRef>
+            <a:fillRef idx="3">
+              <a:schemeClr val="accent1"/>
+            </a:fillRef>
+            <a:effectRef idx="2">
+              <a:schemeClr val="accent1"/>
+            </a:effectRef>
+            <a:fontRef idx="minor">
+              <a:schemeClr val="lt1"/>
+            </a:fontRef>
+          </p:style>
+          <p:txBody>
+            <a:bodyPr tIns="27432" rtlCol="0" anchor="ctr"/>
+            <a:lstStyle/>
+            <a:p>
+              <a:pPr algn="ctr"/>
+              <a:r>
+                <a:rPr lang="en-US" sz="600" b="1" dirty="0" err="1" smtClean="0">
                   <a:solidFill>
                     <a:schemeClr val="tx2"/>
                   </a:solidFill>
                   <a:latin typeface="Trebuchet MS"/>
                   <a:cs typeface="Trebuchet MS"/>
                 </a:rPr>
-                <a:t>IPSUM</a:t>
+                <a:t>Enosis.Services</a:t>
               </a:r>
+              <a:r>
+                <a:rPr lang="en-US" sz="600" dirty="0" smtClean="0">
+                  <a:solidFill>
+                    <a:schemeClr val="tx2"/>
+                  </a:solidFill>
+                  <a:latin typeface="Trebuchet MS"/>
+                  <a:cs typeface="Trebuchet MS"/>
+                </a:rPr>
+                <a:t> </a:t>
+              </a:r>
+              <a:r>
+                <a:rPr lang="en-US" sz="600" dirty="0" err="1" smtClean="0">
+                  <a:solidFill>
+                    <a:schemeClr val="tx2"/>
+                  </a:solidFill>
+                  <a:latin typeface="Trebuchet MS"/>
+                  <a:cs typeface="Trebuchet MS"/>
+                </a:rPr>
+                <a:t>microservice</a:t>
+              </a:r>
+              <a:r>
+                <a:rPr lang="en-US" sz="600" dirty="0" smtClean="0">
+                  <a:solidFill>
+                    <a:schemeClr val="tx2"/>
+                  </a:solidFill>
+                  <a:latin typeface="Trebuchet MS"/>
+                  <a:cs typeface="Trebuchet MS"/>
+                </a:rPr>
+                <a:t>:</a:t>
+              </a:r>
+            </a:p>
+            <a:p>
+              <a:pPr algn="ctr"/>
+              <a:r>
+                <a:rPr lang="en-US" sz="600" dirty="0" smtClean="0">
+                  <a:solidFill>
+                    <a:schemeClr val="tx2"/>
+                  </a:solidFill>
+                  <a:latin typeface="Trebuchet MS"/>
+                  <a:cs typeface="Trebuchet MS"/>
+                </a:rPr>
+                <a:t>Cancellation and change actions.</a:t>
+              </a:r>
+              <a:endParaRPr lang="en-US" sz="600" dirty="0">
+                <a:solidFill>
+                  <a:schemeClr val="tx2"/>
+                </a:solidFill>
+                <a:latin typeface="Trebuchet MS"/>
+                <a:cs typeface="Trebuchet MS"/>
+              </a:endParaRPr>
+            </a:p>
+          </p:txBody>
+        </p:sp>
+        <p:sp>
+          <p:nvSpPr>
+            <p:cNvPr id="32" name="Rectangle 31"/>
+            <p:cNvSpPr/>
+            <p:nvPr/>
+          </p:nvSpPr>
+          <p:spPr>
+            <a:xfrm>
+              <a:off x="6092936" y="4711701"/>
+              <a:ext cx="2744838" cy="331859"/>
+            </a:xfrm>
+            <a:prstGeom prst="rect">
+              <a:avLst/>
+            </a:prstGeom>
+            <a:solidFill>
+              <a:schemeClr val="accent6">
+                <a:lumMod val="20000"/>
+                <a:lumOff val="80000"/>
+              </a:schemeClr>
+            </a:solidFill>
+            <a:ln w="3175" cmpd="sng">
+              <a:solidFill>
+                <a:schemeClr val="accent6"/>
+              </a:solidFill>
+            </a:ln>
+            <a:effectLst/>
+          </p:spPr>
+          <p:style>
+            <a:lnRef idx="1">
+              <a:schemeClr val="accent1"/>
+            </a:lnRef>
+            <a:fillRef idx="3">
+              <a:schemeClr val="accent1"/>
+            </a:fillRef>
+            <a:effectRef idx="2">
+              <a:schemeClr val="accent1"/>
+            </a:effectRef>
+            <a:fontRef idx="minor">
+              <a:schemeClr val="lt1"/>
+            </a:fontRef>
+          </p:style>
+          <p:txBody>
+            <a:bodyPr tIns="27432" rtlCol="0" anchor="ctr"/>
+            <a:lstStyle/>
+            <a:p>
+              <a:pPr algn="ctr"/>
+              <a:r>
+                <a:rPr lang="en-US" sz="600" b="1" dirty="0" err="1" smtClean="0">
+                  <a:solidFill>
+                    <a:srgbClr val="666666"/>
+                  </a:solidFill>
+                  <a:latin typeface="Trebuchet MS"/>
+                  <a:cs typeface="Trebuchet MS"/>
+                </a:rPr>
+                <a:t>FreshDesk</a:t>
+              </a:r>
+              <a:r>
+                <a:rPr lang="en-US" sz="600" b="1" dirty="0" smtClean="0">
+                  <a:solidFill>
+                    <a:srgbClr val="666666"/>
+                  </a:solidFill>
+                  <a:latin typeface="Trebuchet MS"/>
+                  <a:cs typeface="Trebuchet MS"/>
+                </a:rPr>
+                <a:t> API</a:t>
+              </a:r>
+              <a:endParaRPr lang="en-US" sz="600" b="1" dirty="0">
+                <a:solidFill>
+                  <a:srgbClr val="666666"/>
+                </a:solidFill>
+                <a:latin typeface="Trebuchet MS"/>
+                <a:cs typeface="Trebuchet MS"/>
+              </a:endParaRPr>
             </a:p>
           </p:txBody>
         </p:sp>
       </p:grpSp>
+      <p:sp>
+        <p:nvSpPr>
+          <p:cNvPr id="31" name="Rectangle 15"/>
+          <p:cNvSpPr/>
+          <p:nvPr/>
+        </p:nvSpPr>
+        <p:spPr>
+          <a:xfrm>
+            <a:off x="5648249" y="2791702"/>
+            <a:ext cx="1194955" cy="556940"/>
+          </a:xfrm>
+          <a:prstGeom prst="rect">
+            <a:avLst/>
+          </a:prstGeom>
+          <a:solidFill>
+            <a:schemeClr val="bg1"/>
+          </a:solidFill>
+          <a:ln w="3175" cmpd="sng">
+            <a:solidFill>
+              <a:schemeClr val="accent3"/>
+            </a:solidFill>
+          </a:ln>
+          <a:effectLst/>
+        </p:spPr>
+        <p:style>
+          <a:lnRef idx="1">
+            <a:schemeClr val="accent1"/>
+          </a:lnRef>
+          <a:fillRef idx="3">
+            <a:schemeClr val="accent1"/>
+          </a:fillRef>
+          <a:effectRef idx="2">
+            <a:schemeClr val="accent1"/>
+          </a:effectRef>
+          <a:fontRef idx="minor">
+            <a:schemeClr val="lt1"/>
+          </a:fontRef>
+        </p:style>
+        <p:txBody>
+          <a:bodyPr tIns="27432" rtlCol="0" anchor="ctr"/>
+          <a:lstStyle/>
+          <a:p>
+            <a:pPr algn="ctr"/>
+            <a:r>
+              <a:rPr lang="en-US" sz="600" b="1" dirty="0" err="1" smtClean="0">
+                <a:solidFill>
+                  <a:schemeClr val="tx2"/>
+                </a:solidFill>
+                <a:latin typeface="Trebuchet MS"/>
+                <a:cs typeface="Trebuchet MS"/>
+              </a:rPr>
+              <a:t>FreshDeskHub</a:t>
+            </a:r>
+            <a:r>
+              <a:rPr lang="en-US" sz="600" dirty="0" smtClean="0">
+                <a:solidFill>
+                  <a:schemeClr val="tx2"/>
+                </a:solidFill>
+                <a:latin typeface="Trebuchet MS"/>
+                <a:cs typeface="Trebuchet MS"/>
+              </a:rPr>
+              <a:t> </a:t>
+            </a:r>
+            <a:r>
+              <a:rPr lang="en-US" sz="600" dirty="0" err="1" smtClean="0">
+                <a:solidFill>
+                  <a:schemeClr val="tx2"/>
+                </a:solidFill>
+                <a:latin typeface="Trebuchet MS"/>
+                <a:cs typeface="Trebuchet MS"/>
+              </a:rPr>
+              <a:t>microservice</a:t>
+            </a:r>
+            <a:r>
+              <a:rPr lang="en-US" sz="600" dirty="0" smtClean="0">
+                <a:solidFill>
+                  <a:schemeClr val="tx2"/>
+                </a:solidFill>
+                <a:latin typeface="Trebuchet MS"/>
+                <a:cs typeface="Trebuchet MS"/>
+              </a:rPr>
+              <a:t>:</a:t>
+            </a:r>
+          </a:p>
+          <a:p>
+            <a:pPr algn="ctr"/>
+            <a:r>
+              <a:rPr lang="en-US" sz="600" dirty="0" smtClean="0">
+                <a:solidFill>
+                  <a:schemeClr val="tx2"/>
+                </a:solidFill>
+                <a:latin typeface="Trebuchet MS"/>
+                <a:cs typeface="Trebuchet MS"/>
+              </a:rPr>
+              <a:t>Preparation of FD ticket, errors handling</a:t>
+            </a:r>
+            <a:endParaRPr lang="en-US" sz="600" dirty="0">
+              <a:solidFill>
+                <a:schemeClr val="tx2"/>
+              </a:solidFill>
+              <a:latin typeface="Trebuchet MS"/>
+              <a:cs typeface="Trebuchet MS"/>
+            </a:endParaRPr>
+          </a:p>
+        </p:txBody>
+      </p:sp>
+      <p:cxnSp>
+        <p:nvCxnSpPr>
+          <p:cNvPr id="33" name="Straight Arrow Connector 17"/>
+          <p:cNvCxnSpPr/>
+          <p:nvPr/>
+        </p:nvCxnSpPr>
+        <p:spPr>
+          <a:xfrm>
+            <a:off x="6245726" y="2579662"/>
+            <a:ext cx="4708" cy="181402"/>
+          </a:xfrm>
+          <a:prstGeom prst="straightConnector1">
+            <a:avLst/>
+          </a:prstGeom>
+          <a:ln w="3175" cmpd="sng">
+            <a:solidFill>
+              <a:schemeClr val="accent3"/>
+            </a:solidFill>
+            <a:headEnd type="none"/>
+            <a:tailEnd type="triangle" w="sm" len="sm"/>
+          </a:ln>
+          <a:effectLst/>
+        </p:spPr>
+        <p:style>
+          <a:lnRef idx="2">
+            <a:schemeClr val="accent1"/>
+          </a:lnRef>
+          <a:fillRef idx="0">
+            <a:schemeClr val="accent1"/>
+          </a:fillRef>
+          <a:effectRef idx="1">
+            <a:schemeClr val="accent1"/>
+          </a:effectRef>
+          <a:fontRef idx="minor">
+            <a:schemeClr val="tx1"/>
+          </a:fontRef>
+        </p:style>
+      </p:cxnSp>
     </p:spTree>
     <p:extLst>
       <p:ext uri="{BB962C8B-B14F-4D97-AF65-F5344CB8AC3E}">
-        <p14:creationId xmlns:p14="http://schemas.microsoft.com/office/powerpoint/2010/main" val="480573351"/>
+        <p14:creationId xmlns:p14="http://schemas.microsoft.com/office/powerpoint/2010/main" val="1958069615"/>
       </p:ext>
     </p:extLst>
   </p:cSld>
@@ -7362,6 +7563,15 @@
 </file>
 
 <file path=customXml/item1.xml><?xml version="1.0" encoding="utf-8"?>
+<?mso-contentType ?>
+<FormTemplates xmlns="http://schemas.microsoft.com/sharepoint/v3/contenttype/forms">
+  <Display>DocumentLibraryForm</Display>
+  <Edit>DocumentLibraryForm</Edit>
+  <New>DocumentLibraryForm</New>
+</FormTemplates>
+</file>
+
+<file path=customXml/item2.xml><?xml version="1.0" encoding="utf-8"?>
 <ct:contentTypeSchema xmlns:ct="http://schemas.microsoft.com/office/2006/metadata/contentType" xmlns:ma="http://schemas.microsoft.com/office/2006/metadata/properties/metaAttributes" ct:_="" ma:_="" ma:contentTypeName="Document" ma:contentTypeID="0x010100B0E9A4A7D20EA84CAA39F80EA2A19865" ma:contentTypeVersion="1" ma:contentTypeDescription="Create a new document." ma:contentTypeScope="" ma:versionID="4ed0c655cf5595f31b06ef1418ca28bf">
   <xsd:schema xmlns:xsd="http://www.w3.org/2001/XMLSchema" xmlns:xs="http://www.w3.org/2001/XMLSchema" xmlns:p="http://schemas.microsoft.com/office/2006/metadata/properties" xmlns:ns1="http://schemas.microsoft.com/sharepoint/v3" targetNamespace="http://schemas.microsoft.com/office/2006/metadata/properties" ma:root="true" ma:fieldsID="4dcce58c87e9fcebab8021569449a8d0" ns1:_="">
     <xsd:import namespace="http://schemas.microsoft.com/sharepoint/v3"/>
@@ -7493,15 +7703,6 @@
 </ct:contentTypeSchema>
 </file>
 
-<file path=customXml/item2.xml><?xml version="1.0" encoding="utf-8"?>
-<?mso-contentType ?>
-<FormTemplates xmlns="http://schemas.microsoft.com/sharepoint/v3/contenttype/forms">
-  <Display>DocumentLibraryForm</Display>
-  <Edit>DocumentLibraryForm</Edit>
-  <New>DocumentLibraryForm</New>
-</FormTemplates>
-</file>
-
 <file path=customXml/item3.xml><?xml version="1.0" encoding="utf-8"?>
 <p:properties xmlns:p="http://schemas.microsoft.com/office/2006/metadata/properties" xmlns:xsi="http://www.w3.org/2001/XMLSchema-instance" xmlns:pc="http://schemas.microsoft.com/office/infopath/2007/PartnerControls">
   <documentManagement>
@@ -7512,6 +7713,14 @@
 </file>
 
 <file path=customXml/itemProps1.xml><?xml version="1.0" encoding="utf-8"?>
+<ds:datastoreItem xmlns:ds="http://schemas.openxmlformats.org/officeDocument/2006/customXml" ds:itemID="{14883F0F-DE57-4ECA-B9BB-F22E8C5B5D82}">
+  <ds:schemaRefs>
+    <ds:schemaRef ds:uri="http://schemas.microsoft.com/sharepoint/v3/contenttype/forms"/>
+  </ds:schemaRefs>
+</ds:datastoreItem>
+</file>
+
+<file path=customXml/itemProps2.xml><?xml version="1.0" encoding="utf-8"?>
 <ds:datastoreItem xmlns:ds="http://schemas.openxmlformats.org/officeDocument/2006/customXml" ds:itemID="{C3A1A37E-F8E3-427A-BCE9-B1DDB8B96CDF}">
   <ds:schemaRefs>
     <ds:schemaRef ds:uri="http://schemas.microsoft.com/office/2006/metadata/contentType"/>
@@ -7525,14 +7734,6 @@
     <ds:schemaRef ds:uri="http://purl.org/dc/elements/1.1/"/>
     <ds:schemaRef ds:uri="http://purl.org/dc/terms/"/>
     <ds:schemaRef ds:uri="http://schemas.microsoft.com/internal/obd"/>
-  </ds:schemaRefs>
-</ds:datastoreItem>
-</file>
-
-<file path=customXml/itemProps2.xml><?xml version="1.0" encoding="utf-8"?>
-<ds:datastoreItem xmlns:ds="http://schemas.openxmlformats.org/officeDocument/2006/customXml" ds:itemID="{14883F0F-DE57-4ECA-B9BB-F22E8C5B5D82}">
-  <ds:schemaRefs>
-    <ds:schemaRef ds:uri="http://schemas.microsoft.com/sharepoint/v3/contenttype/forms"/>
   </ds:schemaRefs>
 </ds:datastoreItem>
 </file>

</xml_diff>

<commit_message>
added 2 last slides
</commit_message>
<xml_diff>
--- a/Assessment Mikita Charniauski.pptx
+++ b/Assessment Mikita Charniauski.pptx
@@ -5,10 +5,10 @@
     <p:sldMasterId id="2147483730" r:id="rId4"/>
   </p:sldMasterIdLst>
   <p:notesMasterIdLst>
-    <p:notesMasterId r:id="rId10"/>
+    <p:notesMasterId r:id="rId12"/>
   </p:notesMasterIdLst>
   <p:handoutMasterIdLst>
-    <p:handoutMasterId r:id="rId11"/>
+    <p:handoutMasterId r:id="rId13"/>
   </p:handoutMasterIdLst>
   <p:sldIdLst>
     <p:sldId id="448" r:id="rId5"/>
@@ -16,6 +16,8 @@
     <p:sldId id="449" r:id="rId7"/>
     <p:sldId id="450" r:id="rId8"/>
     <p:sldId id="451" r:id="rId9"/>
+    <p:sldId id="452" r:id="rId10"/>
+    <p:sldId id="453" r:id="rId11"/>
   </p:sldIdLst>
   <p:sldSz cx="9144000" cy="5143500" type="screen16x9"/>
   <p:notesSz cx="6858000" cy="9144000"/>
@@ -386,7 +388,7 @@
           <a:p>
             <a:fld id="{7F5E9BF7-95E4-A242-BA1D-05FDCF603BE6}" type="datetime1">
               <a:rPr lang="en-US" smtClean="0"/>
-              <a:t>5/20/2018</a:t>
+              <a:t>5/23/2018</a:t>
             </a:fld>
             <a:endParaRPr lang="en-US"/>
           </a:p>
@@ -552,7 +554,7 @@
           <a:p>
             <a:fld id="{165DBCB1-0306-AD41-9452-11E7C08D5C04}" type="datetime1">
               <a:rPr lang="en-US" smtClean="0"/>
-              <a:t>5/20/2018</a:t>
+              <a:t>5/23/2018</a:t>
             </a:fld>
             <a:endParaRPr lang="en-US"/>
           </a:p>
@@ -1032,6 +1034,112 @@
 </p:notes>
 </file>
 
+<file path=ppt/notesSlides/notesSlide3.xml><?xml version="1.0" encoding="utf-8"?>
+<p:notes xmlns:a="http://schemas.openxmlformats.org/drawingml/2006/main" xmlns:r="http://schemas.openxmlformats.org/officeDocument/2006/relationships" xmlns:p="http://schemas.openxmlformats.org/presentationml/2006/main">
+  <p:cSld>
+    <p:spTree>
+      <p:nvGrpSpPr>
+        <p:cNvPr id="1" name=""/>
+        <p:cNvGrpSpPr/>
+        <p:nvPr/>
+      </p:nvGrpSpPr>
+      <p:grpSpPr>
+        <a:xfrm>
+          <a:off x="0" y="0"/>
+          <a:ext cx="0" cy="0"/>
+          <a:chOff x="0" y="0"/>
+          <a:chExt cx="0" cy="0"/>
+        </a:xfrm>
+      </p:grpSpPr>
+      <p:sp>
+        <p:nvSpPr>
+          <p:cNvPr id="2" name="Slide Image Placeholder 1"/>
+          <p:cNvSpPr>
+            <a:spLocks noGrp="1" noRot="1" noChangeAspect="1"/>
+          </p:cNvSpPr>
+          <p:nvPr>
+            <p:ph type="sldImg"/>
+          </p:nvPr>
+        </p:nvSpPr>
+        <p:spPr>
+          <a:xfrm>
+            <a:off x="381000" y="685800"/>
+            <a:ext cx="6096000" cy="3429000"/>
+          </a:xfrm>
+        </p:spPr>
+      </p:sp>
+      <p:sp>
+        <p:nvSpPr>
+          <p:cNvPr id="3" name="Notes Placeholder 2"/>
+          <p:cNvSpPr>
+            <a:spLocks noGrp="1"/>
+          </p:cNvSpPr>
+          <p:nvPr>
+            <p:ph type="body" idx="1"/>
+          </p:nvPr>
+        </p:nvSpPr>
+        <p:spPr/>
+        <p:txBody>
+          <a:bodyPr/>
+          <a:lstStyle/>
+          <a:p>
+            <a:pPr marL="0" marR="0" indent="0" algn="l" defTabSz="914400" rtl="0" eaLnBrk="1" fontAlgn="auto" latinLnBrk="0" hangingPunct="1">
+              <a:lnSpc>
+                <a:spcPct val="100000"/>
+              </a:lnSpc>
+              <a:spcBef>
+                <a:spcPts val="0"/>
+              </a:spcBef>
+              <a:spcAft>
+                <a:spcPts val="0"/>
+              </a:spcAft>
+              <a:buClrTx/>
+              <a:buSzTx/>
+              <a:buFontTx/>
+              <a:buNone/>
+              <a:tabLst/>
+              <a:defRPr/>
+            </a:pPr>
+            <a:endParaRPr lang="en-US" dirty="0"/>
+          </a:p>
+        </p:txBody>
+      </p:sp>
+      <p:sp>
+        <p:nvSpPr>
+          <p:cNvPr id="4" name="Slide Number Placeholder 3"/>
+          <p:cNvSpPr>
+            <a:spLocks noGrp="1"/>
+          </p:cNvSpPr>
+          <p:nvPr>
+            <p:ph type="sldNum" sz="quarter" idx="10"/>
+          </p:nvPr>
+        </p:nvSpPr>
+        <p:spPr/>
+        <p:txBody>
+          <a:bodyPr/>
+          <a:lstStyle/>
+          <a:p>
+            <a:fld id="{7AE90029-A909-AD4E-9775-A0D64990AD22}" type="slidenum">
+              <a:rPr lang="en-US" smtClean="0"/>
+              <a:t>6</a:t>
+            </a:fld>
+            <a:endParaRPr lang="en-US"/>
+          </a:p>
+        </p:txBody>
+      </p:sp>
+    </p:spTree>
+    <p:extLst>
+      <p:ext uri="{BB962C8B-B14F-4D97-AF65-F5344CB8AC3E}">
+        <p14:creationId xmlns:p14="http://schemas.microsoft.com/office/powerpoint/2010/main" val="1402010326"/>
+      </p:ext>
+    </p:extLst>
+  </p:cSld>
+  <p:clrMapOvr>
+    <a:masterClrMapping/>
+  </p:clrMapOvr>
+</p:notes>
+</file>
+
 <file path=ppt/slideLayouts/slideLayout1.xml><?xml version="1.0" encoding="utf-8"?>
 <p:sldLayout xmlns:a="http://schemas.openxmlformats.org/drawingml/2006/main" xmlns:r="http://schemas.openxmlformats.org/officeDocument/2006/relationships" xmlns:p="http://schemas.openxmlformats.org/presentationml/2006/main" preserve="1" userDrawn="1">
   <p:cSld name="Text Title">
@@ -1314,6 +1422,183 @@
     <p:extLst>
       <p:ext uri="{BB962C8B-B14F-4D97-AF65-F5344CB8AC3E}">
         <p14:creationId xmlns:p14="http://schemas.microsoft.com/office/powerpoint/2010/main" val="282548420"/>
+      </p:ext>
+    </p:extLst>
+  </p:cSld>
+  <p:clrMapOvr>
+    <a:masterClrMapping/>
+  </p:clrMapOvr>
+</p:sldLayout>
+</file>
+
+<file path=ppt/slideLayouts/slideLayout10.xml><?xml version="1.0" encoding="utf-8"?>
+<p:sldLayout xmlns:a="http://schemas.openxmlformats.org/drawingml/2006/main" xmlns:r="http://schemas.openxmlformats.org/officeDocument/2006/relationships" xmlns:p="http://schemas.openxmlformats.org/presentationml/2006/main" userDrawn="1">
+  <p:cSld name="Map Background">
+    <p:spTree>
+      <p:nvGrpSpPr>
+        <p:cNvPr id="1" name=""/>
+        <p:cNvGrpSpPr/>
+        <p:nvPr/>
+      </p:nvGrpSpPr>
+      <p:grpSpPr>
+        <a:xfrm>
+          <a:off x="0" y="0"/>
+          <a:ext cx="0" cy="0"/>
+          <a:chOff x="0" y="0"/>
+          <a:chExt cx="0" cy="0"/>
+        </a:xfrm>
+      </p:grpSpPr>
+      <p:sp>
+        <p:nvSpPr>
+          <p:cNvPr id="5" name="Rectangle 4"/>
+          <p:cNvSpPr/>
+          <p:nvPr userDrawn="1"/>
+        </p:nvSpPr>
+        <p:spPr>
+          <a:xfrm>
+            <a:off x="0" y="0"/>
+            <a:ext cx="9144000" cy="5143500"/>
+          </a:xfrm>
+          <a:prstGeom prst="rect">
+            <a:avLst/>
+          </a:prstGeom>
+          <a:gradFill flip="none" rotWithShape="1">
+            <a:gsLst>
+              <a:gs pos="0">
+                <a:srgbClr val="1A9CB0"/>
+              </a:gs>
+              <a:gs pos="100000">
+                <a:srgbClr val="2FC2D9"/>
+              </a:gs>
+            </a:gsLst>
+            <a:lin ang="17640000" scaled="0"/>
+            <a:tileRect/>
+          </a:gradFill>
+          <a:ln>
+            <a:noFill/>
+          </a:ln>
+          <a:effectLst/>
+        </p:spPr>
+        <p:style>
+          <a:lnRef idx="1">
+            <a:schemeClr val="accent1"/>
+          </a:lnRef>
+          <a:fillRef idx="3">
+            <a:schemeClr val="accent1"/>
+          </a:fillRef>
+          <a:effectRef idx="2">
+            <a:schemeClr val="accent1"/>
+          </a:effectRef>
+          <a:fontRef idx="minor">
+            <a:schemeClr val="lt1"/>
+          </a:fontRef>
+        </p:style>
+        <p:txBody>
+          <a:bodyPr lIns="68580" tIns="34290" rIns="68580" bIns="34290" rtlCol="0" anchor="ctr"/>
+          <a:lstStyle/>
+          <a:p>
+            <a:pPr algn="ctr">
+              <a:lnSpc>
+                <a:spcPct val="85000"/>
+              </a:lnSpc>
+            </a:pPr>
+            <a:endParaRPr lang="en-US" sz="1400" dirty="0"/>
+          </a:p>
+        </p:txBody>
+      </p:sp>
+      <p:sp>
+        <p:nvSpPr>
+          <p:cNvPr id="6" name="Text Placeholder 2"/>
+          <p:cNvSpPr>
+            <a:spLocks noGrp="1"/>
+          </p:cNvSpPr>
+          <p:nvPr>
+            <p:ph idx="1" hasCustomPrompt="1"/>
+          </p:nvPr>
+        </p:nvSpPr>
+        <p:spPr>
+          <a:xfrm>
+            <a:off x="626532" y="2398060"/>
+            <a:ext cx="7574494" cy="2191404"/>
+          </a:xfrm>
+          <a:prstGeom prst="rect">
+            <a:avLst/>
+          </a:prstGeom>
+        </p:spPr>
+        <p:txBody>
+          <a:bodyPr vert="horz" lIns="68580" tIns="34290" rIns="68580" bIns="34290" rtlCol="0">
+            <a:noAutofit/>
+          </a:bodyPr>
+          <a:lstStyle>
+            <a:lvl1pPr marL="0" indent="0">
+              <a:lnSpc>
+                <a:spcPct val="85000"/>
+              </a:lnSpc>
+              <a:spcBef>
+                <a:spcPts val="0"/>
+              </a:spcBef>
+              <a:buFontTx/>
+              <a:buNone/>
+              <a:defRPr sz="3400">
+                <a:solidFill>
+                  <a:schemeClr val="bg1"/>
+                </a:solidFill>
+                <a:latin typeface="Arial Black"/>
+                <a:cs typeface="Arial Black"/>
+              </a:defRPr>
+            </a:lvl1pPr>
+            <a:lvl2pPr>
+              <a:defRPr sz="1200"/>
+            </a:lvl2pPr>
+            <a:lvl3pPr>
+              <a:defRPr sz="1200"/>
+            </a:lvl3pPr>
+            <a:lvl4pPr>
+              <a:defRPr sz="1200"/>
+            </a:lvl4pPr>
+            <a:lvl5pPr>
+              <a:defRPr sz="1200"/>
+            </a:lvl5pPr>
+          </a:lstStyle>
+          <a:p>
+            <a:pPr lvl="0"/>
+            <a:r>
+              <a:rPr lang="en-US" dirty="0"/>
+              <a:t>CLICK TO ADD HEADLINE</a:t>
+            </a:r>
+          </a:p>
+        </p:txBody>
+      </p:sp>
+      <p:pic>
+        <p:nvPicPr>
+          <p:cNvPr id="4" name="Picture 3"/>
+          <p:cNvPicPr>
+            <a:picLocks noChangeAspect="1"/>
+          </p:cNvPicPr>
+          <p:nvPr userDrawn="1"/>
+        </p:nvPicPr>
+        <p:blipFill>
+          <a:blip r:embed="rId2">
+            <a:alphaModFix amt="25000"/>
+          </a:blip>
+          <a:stretch>
+            <a:fillRect/>
+          </a:stretch>
+        </p:blipFill>
+        <p:spPr>
+          <a:xfrm>
+            <a:off x="-238103" y="-141032"/>
+            <a:ext cx="9627732" cy="5588000"/>
+          </a:xfrm>
+          <a:prstGeom prst="rect">
+            <a:avLst/>
+          </a:prstGeom>
+        </p:spPr>
+      </p:pic>
+    </p:spTree>
+    <p:extLst>
+      <p:ext uri="{BB962C8B-B14F-4D97-AF65-F5344CB8AC3E}">
+        <p14:creationId xmlns:p14="http://schemas.microsoft.com/office/powerpoint/2010/main" val="3888486096"/>
       </p:ext>
     </p:extLst>
   </p:cSld>
@@ -3954,7 +4239,7 @@
           <p:nvPr userDrawn="1"/>
         </p:nvPicPr>
         <p:blipFill>
-          <a:blip r:embed="rId11" cstate="screen">
+          <a:blip r:embed="rId12" cstate="screen">
             <a:extLst>
               <a:ext uri="{28A0092B-C50C-407E-A947-70E740481C1C}">
                 <a14:useLocalDpi xmlns:a14="http://schemas.microsoft.com/office/drawing/2010/main"/>
@@ -3993,6 +4278,7 @@
     <p:sldLayoutId id="2147483752" r:id="rId7"/>
     <p:sldLayoutId id="2147483753" r:id="rId8"/>
     <p:sldLayoutId id="2147483754" r:id="rId9"/>
+    <p:sldLayoutId id="2147483755" r:id="rId10"/>
   </p:sldLayoutIdLst>
   <p:txStyles>
     <p:titleStyle>
@@ -6640,6 +6926,716 @@
     <p:extLst>
       <p:ext uri="{BB962C8B-B14F-4D97-AF65-F5344CB8AC3E}">
         <p14:creationId xmlns:p14="http://schemas.microsoft.com/office/powerpoint/2010/main" val="1958069615"/>
+      </p:ext>
+    </p:extLst>
+  </p:cSld>
+  <p:clrMapOvr>
+    <a:masterClrMapping/>
+  </p:clrMapOvr>
+  <p:timing>
+    <p:tnLst>
+      <p:par>
+        <p:cTn id="1" dur="indefinite" restart="never" nodeType="tmRoot"/>
+      </p:par>
+    </p:tnLst>
+  </p:timing>
+</p:sld>
+</file>
+
+<file path=ppt/slides/slide6.xml><?xml version="1.0" encoding="utf-8"?>
+<p:sld xmlns:a="http://schemas.openxmlformats.org/drawingml/2006/main" xmlns:r="http://schemas.openxmlformats.org/officeDocument/2006/relationships" xmlns:p="http://schemas.openxmlformats.org/presentationml/2006/main">
+  <p:cSld>
+    <p:spTree>
+      <p:nvGrpSpPr>
+        <p:cNvPr id="1" name=""/>
+        <p:cNvGrpSpPr/>
+        <p:nvPr/>
+      </p:nvGrpSpPr>
+      <p:grpSpPr>
+        <a:xfrm>
+          <a:off x="0" y="0"/>
+          <a:ext cx="0" cy="0"/>
+          <a:chOff x="0" y="0"/>
+          <a:chExt cx="0" cy="0"/>
+        </a:xfrm>
+      </p:grpSpPr>
+      <p:sp>
+        <p:nvSpPr>
+          <p:cNvPr id="13" name="Text Placeholder 12"/>
+          <p:cNvSpPr>
+            <a:spLocks noGrp="1"/>
+          </p:cNvSpPr>
+          <p:nvPr>
+            <p:ph type="body" sz="quarter" idx="10"/>
+          </p:nvPr>
+        </p:nvSpPr>
+        <p:spPr/>
+        <p:txBody>
+          <a:bodyPr/>
+          <a:lstStyle/>
+          <a:p>
+            <a:r>
+              <a:rPr lang="en-US" dirty="0"/>
+              <a:t>Also I’d like to mention:</a:t>
+            </a:r>
+          </a:p>
+        </p:txBody>
+      </p:sp>
+      <p:grpSp>
+        <p:nvGrpSpPr>
+          <p:cNvPr id="2" name="Group 1"/>
+          <p:cNvGrpSpPr/>
+          <p:nvPr/>
+        </p:nvGrpSpPr>
+        <p:grpSpPr>
+          <a:xfrm>
+            <a:off x="357781" y="1124734"/>
+            <a:ext cx="8470687" cy="762841"/>
+            <a:chOff x="448467" y="1385345"/>
+            <a:chExt cx="11294249" cy="1017120"/>
+          </a:xfrm>
+        </p:grpSpPr>
+        <p:sp>
+          <p:nvSpPr>
+            <p:cNvPr id="14" name="TextBox 13"/>
+            <p:cNvSpPr txBox="1"/>
+            <p:nvPr/>
+          </p:nvSpPr>
+          <p:spPr>
+            <a:xfrm>
+              <a:off x="991818" y="1417581"/>
+              <a:ext cx="10750898" cy="984884"/>
+            </a:xfrm>
+            <a:prstGeom prst="rect">
+              <a:avLst/>
+            </a:prstGeom>
+            <a:noFill/>
+          </p:spPr>
+          <p:txBody>
+            <a:bodyPr wrap="square" rtlCol="0">
+              <a:spAutoFit/>
+            </a:bodyPr>
+            <a:lstStyle/>
+            <a:p>
+              <a:pPr>
+                <a:buClr>
+                  <a:schemeClr val="bg1"/>
+                </a:buClr>
+                <a:buSzPct val="140000"/>
+              </a:pPr>
+              <a:r>
+                <a:rPr lang="en-US" dirty="0" smtClean="0">
+                  <a:solidFill>
+                    <a:srgbClr val="444444"/>
+                  </a:solidFill>
+                  <a:latin typeface="Trebuchet MS"/>
+                  <a:cs typeface="Trebuchet MS"/>
+                </a:rPr>
+                <a:t>Applications are implemented as micro services</a:t>
+              </a:r>
+              <a:r>
+                <a:rPr lang="en-US" dirty="0">
+                  <a:solidFill>
+                    <a:srgbClr val="444444"/>
+                  </a:solidFill>
+                  <a:cs typeface="Trebuchet MS"/>
+                </a:rPr>
+                <a:t>. </a:t>
+              </a:r>
+              <a:r>
+                <a:rPr lang="en-US" dirty="0" smtClean="0">
+                  <a:solidFill>
+                    <a:srgbClr val="444444"/>
+                  </a:solidFill>
+                  <a:cs typeface="Trebuchet MS"/>
+                </a:rPr>
+                <a:t>Thereby</a:t>
+              </a:r>
+              <a:r>
+                <a:rPr lang="ru-RU" dirty="0" smtClean="0">
+                  <a:solidFill>
+                    <a:srgbClr val="444444"/>
+                  </a:solidFill>
+                  <a:cs typeface="Trebuchet MS"/>
+                </a:rPr>
+                <a:t> </a:t>
+              </a:r>
+              <a:r>
+                <a:rPr lang="en-US" dirty="0" smtClean="0">
+                  <a:solidFill>
+                    <a:srgbClr val="444444"/>
+                  </a:solidFill>
+                  <a:cs typeface="Trebuchet MS"/>
+                </a:rPr>
+                <a:t>we </a:t>
+              </a:r>
+              <a:r>
+                <a:rPr lang="en-US" dirty="0" smtClean="0">
+                  <a:solidFill>
+                    <a:srgbClr val="444444"/>
+                  </a:solidFill>
+                  <a:latin typeface="Trebuchet MS"/>
+                  <a:cs typeface="Trebuchet MS"/>
+                </a:rPr>
+                <a:t>don’t create branch with all features for concrete sprint or hotfix. But we push them to master and deploy to staging/production after implementation. </a:t>
+              </a:r>
+              <a:endParaRPr lang="en-US" dirty="0">
+                <a:solidFill>
+                  <a:srgbClr val="444444"/>
+                </a:solidFill>
+                <a:latin typeface="Trebuchet MS"/>
+                <a:cs typeface="Trebuchet MS"/>
+              </a:endParaRPr>
+            </a:p>
+          </p:txBody>
+        </p:sp>
+        <p:grpSp>
+          <p:nvGrpSpPr>
+            <p:cNvPr id="3" name="Group 2"/>
+            <p:cNvGrpSpPr/>
+            <p:nvPr/>
+          </p:nvGrpSpPr>
+          <p:grpSpPr>
+            <a:xfrm>
+              <a:off x="448467" y="1385345"/>
+              <a:ext cx="464582" cy="464582"/>
+              <a:chOff x="448467" y="1385718"/>
+              <a:chExt cx="464582" cy="464582"/>
+            </a:xfrm>
+          </p:grpSpPr>
+          <p:sp>
+            <p:nvSpPr>
+              <p:cNvPr id="38" name="Oval 37"/>
+              <p:cNvSpPr/>
+              <p:nvPr/>
+            </p:nvSpPr>
+            <p:spPr>
+              <a:xfrm>
+                <a:off x="448467" y="1385718"/>
+                <a:ext cx="464582" cy="464582"/>
+              </a:xfrm>
+              <a:prstGeom prst="ellipse">
+                <a:avLst/>
+              </a:prstGeom>
+              <a:solidFill>
+                <a:srgbClr val="2FC2D9"/>
+              </a:solidFill>
+              <a:ln>
+                <a:noFill/>
+              </a:ln>
+              <a:effectLst/>
+            </p:spPr>
+            <p:style>
+              <a:lnRef idx="1">
+                <a:schemeClr val="accent1"/>
+              </a:lnRef>
+              <a:fillRef idx="3">
+                <a:schemeClr val="accent1"/>
+              </a:fillRef>
+              <a:effectRef idx="2">
+                <a:schemeClr val="accent1"/>
+              </a:effectRef>
+              <a:fontRef idx="minor">
+                <a:schemeClr val="lt1"/>
+              </a:fontRef>
+            </p:style>
+            <p:txBody>
+              <a:bodyPr rtlCol="0" anchor="ctr"/>
+              <a:lstStyle/>
+              <a:p>
+                <a:pPr algn="ctr"/>
+                <a:endParaRPr lang="en-US" dirty="0"/>
+              </a:p>
+            </p:txBody>
+          </p:sp>
+          <p:sp>
+            <p:nvSpPr>
+              <p:cNvPr id="39" name="TextBox 38"/>
+              <p:cNvSpPr txBox="1"/>
+              <p:nvPr/>
+            </p:nvSpPr>
+            <p:spPr>
+              <a:xfrm>
+                <a:off x="470439" y="1427189"/>
+                <a:ext cx="417291" cy="406265"/>
+              </a:xfrm>
+              <a:prstGeom prst="rect">
+                <a:avLst/>
+              </a:prstGeom>
+              <a:noFill/>
+            </p:spPr>
+            <p:txBody>
+              <a:bodyPr wrap="none" tIns="27432" rtlCol="0">
+                <a:spAutoFit/>
+              </a:bodyPr>
+              <a:lstStyle/>
+              <a:p>
+                <a:pPr algn="ctr"/>
+                <a:r>
+                  <a:rPr lang="en-US" sz="1500" b="1" dirty="0">
+                    <a:solidFill>
+                      <a:schemeClr val="bg1"/>
+                    </a:solidFill>
+                    <a:latin typeface="Arial Black"/>
+                    <a:cs typeface="Arial Black"/>
+                  </a:rPr>
+                  <a:t>1</a:t>
+                </a:r>
+              </a:p>
+            </p:txBody>
+          </p:sp>
+        </p:grpSp>
+      </p:grpSp>
+      <p:grpSp>
+        <p:nvGrpSpPr>
+          <p:cNvPr id="5" name="Group 4"/>
+          <p:cNvGrpSpPr/>
+          <p:nvPr/>
+        </p:nvGrpSpPr>
+        <p:grpSpPr>
+          <a:xfrm>
+            <a:off x="357781" y="1898389"/>
+            <a:ext cx="8470687" cy="578175"/>
+            <a:chOff x="448467" y="2074215"/>
+            <a:chExt cx="11294248" cy="770899"/>
+          </a:xfrm>
+        </p:grpSpPr>
+        <p:sp>
+          <p:nvSpPr>
+            <p:cNvPr id="17" name="TextBox 16"/>
+            <p:cNvSpPr txBox="1"/>
+            <p:nvPr/>
+          </p:nvSpPr>
+          <p:spPr>
+            <a:xfrm>
+              <a:off x="991818" y="2106451"/>
+              <a:ext cx="10750897" cy="738663"/>
+            </a:xfrm>
+            <a:prstGeom prst="rect">
+              <a:avLst/>
+            </a:prstGeom>
+            <a:noFill/>
+          </p:spPr>
+          <p:txBody>
+            <a:bodyPr wrap="square" rtlCol="0">
+              <a:spAutoFit/>
+            </a:bodyPr>
+            <a:lstStyle/>
+            <a:p>
+              <a:pPr>
+                <a:buClr>
+                  <a:schemeClr val="bg1"/>
+                </a:buClr>
+                <a:buSzPct val="140000"/>
+              </a:pPr>
+              <a:r>
+                <a:rPr lang="en-US" sz="1500" dirty="0" smtClean="0">
+                  <a:solidFill>
+                    <a:srgbClr val="444444"/>
+                  </a:solidFill>
+                  <a:latin typeface="Trebuchet MS"/>
+                  <a:cs typeface="Trebuchet MS"/>
+                </a:rPr>
+                <a:t>There are no QAs in the project. For each feature it’s developer create Unit tests. Also we have automation tests.</a:t>
+              </a:r>
+              <a:endParaRPr lang="en-US" sz="1500" dirty="0">
+                <a:solidFill>
+                  <a:srgbClr val="444444"/>
+                </a:solidFill>
+                <a:latin typeface="Trebuchet MS"/>
+                <a:cs typeface="Trebuchet MS"/>
+              </a:endParaRPr>
+            </a:p>
+          </p:txBody>
+        </p:sp>
+        <p:grpSp>
+          <p:nvGrpSpPr>
+            <p:cNvPr id="6" name="Group 5"/>
+            <p:cNvGrpSpPr/>
+            <p:nvPr/>
+          </p:nvGrpSpPr>
+          <p:grpSpPr>
+            <a:xfrm>
+              <a:off x="448467" y="2074215"/>
+              <a:ext cx="464582" cy="464582"/>
+              <a:chOff x="448467" y="2071851"/>
+              <a:chExt cx="464582" cy="464582"/>
+            </a:xfrm>
+          </p:grpSpPr>
+          <p:sp>
+            <p:nvSpPr>
+              <p:cNvPr id="40" name="Oval 39"/>
+              <p:cNvSpPr/>
+              <p:nvPr/>
+            </p:nvSpPr>
+            <p:spPr>
+              <a:xfrm>
+                <a:off x="448467" y="2071851"/>
+                <a:ext cx="464582" cy="464582"/>
+              </a:xfrm>
+              <a:prstGeom prst="ellipse">
+                <a:avLst/>
+              </a:prstGeom>
+              <a:solidFill>
+                <a:srgbClr val="2FC2D9"/>
+              </a:solidFill>
+              <a:ln>
+                <a:noFill/>
+              </a:ln>
+              <a:effectLst/>
+            </p:spPr>
+            <p:style>
+              <a:lnRef idx="1">
+                <a:schemeClr val="accent1"/>
+              </a:lnRef>
+              <a:fillRef idx="3">
+                <a:schemeClr val="accent1"/>
+              </a:fillRef>
+              <a:effectRef idx="2">
+                <a:schemeClr val="accent1"/>
+              </a:effectRef>
+              <a:fontRef idx="minor">
+                <a:schemeClr val="lt1"/>
+              </a:fontRef>
+            </p:style>
+            <p:txBody>
+              <a:bodyPr rtlCol="0" anchor="ctr"/>
+              <a:lstStyle/>
+              <a:p>
+                <a:pPr algn="ctr"/>
+                <a:endParaRPr lang="en-US"/>
+              </a:p>
+            </p:txBody>
+          </p:sp>
+          <p:sp>
+            <p:nvSpPr>
+              <p:cNvPr id="41" name="TextBox 40"/>
+              <p:cNvSpPr txBox="1"/>
+              <p:nvPr/>
+            </p:nvSpPr>
+            <p:spPr>
+              <a:xfrm>
+                <a:off x="472508" y="2113322"/>
+                <a:ext cx="417291" cy="406265"/>
+              </a:xfrm>
+              <a:prstGeom prst="rect">
+                <a:avLst/>
+              </a:prstGeom>
+              <a:noFill/>
+            </p:spPr>
+            <p:txBody>
+              <a:bodyPr wrap="none" tIns="27432" rtlCol="0">
+                <a:spAutoFit/>
+              </a:bodyPr>
+              <a:lstStyle/>
+              <a:p>
+                <a:pPr algn="ctr"/>
+                <a:r>
+                  <a:rPr lang="en-US" sz="1500" dirty="0">
+                    <a:solidFill>
+                      <a:schemeClr val="bg1"/>
+                    </a:solidFill>
+                    <a:latin typeface="Arial Black"/>
+                    <a:cs typeface="Arial Black"/>
+                  </a:rPr>
+                  <a:t>2</a:t>
+                </a:r>
+              </a:p>
+            </p:txBody>
+          </p:sp>
+        </p:grpSp>
+      </p:grpSp>
+      <p:grpSp>
+        <p:nvGrpSpPr>
+          <p:cNvPr id="10" name="Group 9"/>
+          <p:cNvGrpSpPr/>
+          <p:nvPr/>
+        </p:nvGrpSpPr>
+        <p:grpSpPr>
+          <a:xfrm>
+            <a:off x="357781" y="2494957"/>
+            <a:ext cx="8470688" cy="578175"/>
+            <a:chOff x="448467" y="2763085"/>
+            <a:chExt cx="11294249" cy="770899"/>
+          </a:xfrm>
+        </p:grpSpPr>
+        <p:sp>
+          <p:nvSpPr>
+            <p:cNvPr id="18" name="TextBox 17"/>
+            <p:cNvSpPr txBox="1"/>
+            <p:nvPr/>
+          </p:nvSpPr>
+          <p:spPr>
+            <a:xfrm>
+              <a:off x="991819" y="2795321"/>
+              <a:ext cx="10750897" cy="738663"/>
+            </a:xfrm>
+            <a:prstGeom prst="rect">
+              <a:avLst/>
+            </a:prstGeom>
+            <a:noFill/>
+          </p:spPr>
+          <p:txBody>
+            <a:bodyPr wrap="square" rtlCol="0">
+              <a:spAutoFit/>
+            </a:bodyPr>
+            <a:lstStyle/>
+            <a:p>
+              <a:pPr>
+                <a:buClr>
+                  <a:schemeClr val="bg1"/>
+                </a:buClr>
+                <a:buSzPct val="140000"/>
+              </a:pPr>
+              <a:r>
+                <a:rPr lang="en-US" sz="1500" dirty="0" smtClean="0">
+                  <a:solidFill>
+                    <a:srgbClr val="444444"/>
+                  </a:solidFill>
+                  <a:latin typeface="Trebuchet MS"/>
+                  <a:cs typeface="Trebuchet MS"/>
+                </a:rPr>
+                <a:t>According to diagram(too big for slides) the system consists of 30+ </a:t>
+              </a:r>
+              <a:r>
+                <a:rPr lang="en-US" sz="1500" dirty="0" err="1" smtClean="0">
+                  <a:solidFill>
+                    <a:srgbClr val="444444"/>
+                  </a:solidFill>
+                  <a:latin typeface="Trebuchet MS"/>
+                  <a:cs typeface="Trebuchet MS"/>
+                </a:rPr>
+                <a:t>microservices</a:t>
+              </a:r>
+              <a:r>
+                <a:rPr lang="en-US" sz="1500" dirty="0" smtClean="0">
+                  <a:solidFill>
+                    <a:srgbClr val="444444"/>
+                  </a:solidFill>
+                  <a:latin typeface="Trebuchet MS"/>
+                  <a:cs typeface="Trebuchet MS"/>
+                </a:rPr>
+                <a:t>/applications</a:t>
+              </a:r>
+              <a:endParaRPr lang="en-US" sz="1500" dirty="0">
+                <a:solidFill>
+                  <a:srgbClr val="444444"/>
+                </a:solidFill>
+                <a:latin typeface="Trebuchet MS"/>
+                <a:cs typeface="Trebuchet MS"/>
+              </a:endParaRPr>
+            </a:p>
+          </p:txBody>
+        </p:sp>
+        <p:grpSp>
+          <p:nvGrpSpPr>
+            <p:cNvPr id="7" name="Group 6"/>
+            <p:cNvGrpSpPr/>
+            <p:nvPr/>
+          </p:nvGrpSpPr>
+          <p:grpSpPr>
+            <a:xfrm>
+              <a:off x="448467" y="2763085"/>
+              <a:ext cx="464582" cy="464582"/>
+              <a:chOff x="448467" y="2760563"/>
+              <a:chExt cx="464582" cy="464582"/>
+            </a:xfrm>
+          </p:grpSpPr>
+          <p:sp>
+            <p:nvSpPr>
+              <p:cNvPr id="42" name="Oval 41"/>
+              <p:cNvSpPr/>
+              <p:nvPr/>
+            </p:nvSpPr>
+            <p:spPr>
+              <a:xfrm>
+                <a:off x="448467" y="2760563"/>
+                <a:ext cx="464582" cy="464582"/>
+              </a:xfrm>
+              <a:prstGeom prst="ellipse">
+                <a:avLst/>
+              </a:prstGeom>
+              <a:solidFill>
+                <a:srgbClr val="2FC2D9"/>
+              </a:solidFill>
+              <a:ln>
+                <a:noFill/>
+              </a:ln>
+              <a:effectLst/>
+            </p:spPr>
+            <p:style>
+              <a:lnRef idx="1">
+                <a:schemeClr val="accent1"/>
+              </a:lnRef>
+              <a:fillRef idx="3">
+                <a:schemeClr val="accent1"/>
+              </a:fillRef>
+              <a:effectRef idx="2">
+                <a:schemeClr val="accent1"/>
+              </a:effectRef>
+              <a:fontRef idx="minor">
+                <a:schemeClr val="lt1"/>
+              </a:fontRef>
+            </p:style>
+            <p:txBody>
+              <a:bodyPr rtlCol="0" anchor="ctr"/>
+              <a:lstStyle/>
+              <a:p>
+                <a:pPr algn="ctr"/>
+                <a:endParaRPr lang="en-US" dirty="0"/>
+              </a:p>
+            </p:txBody>
+          </p:sp>
+          <p:sp>
+            <p:nvSpPr>
+              <p:cNvPr id="43" name="TextBox 42"/>
+              <p:cNvSpPr txBox="1"/>
+              <p:nvPr/>
+            </p:nvSpPr>
+            <p:spPr>
+              <a:xfrm>
+                <a:off x="472508" y="2802034"/>
+                <a:ext cx="417291" cy="406265"/>
+              </a:xfrm>
+              <a:prstGeom prst="rect">
+                <a:avLst/>
+              </a:prstGeom>
+              <a:noFill/>
+            </p:spPr>
+            <p:txBody>
+              <a:bodyPr wrap="none" tIns="27432" rtlCol="0">
+                <a:spAutoFit/>
+              </a:bodyPr>
+              <a:lstStyle/>
+              <a:p>
+                <a:pPr algn="ctr"/>
+                <a:r>
+                  <a:rPr lang="en-US" sz="1500" b="1" dirty="0" smtClean="0">
+                    <a:solidFill>
+                      <a:schemeClr val="bg1"/>
+                    </a:solidFill>
+                    <a:latin typeface="Arial Black"/>
+                    <a:cs typeface="Arial Black"/>
+                  </a:rPr>
+                  <a:t>3</a:t>
+                </a:r>
+                <a:endParaRPr lang="en-US" sz="1500" b="1" dirty="0">
+                  <a:solidFill>
+                    <a:schemeClr val="bg1"/>
+                  </a:solidFill>
+                  <a:latin typeface="Arial Black"/>
+                  <a:cs typeface="Arial Black"/>
+                </a:endParaRPr>
+              </a:p>
+            </p:txBody>
+          </p:sp>
+        </p:grpSp>
+      </p:grpSp>
+    </p:spTree>
+    <p:extLst>
+      <p:ext uri="{BB962C8B-B14F-4D97-AF65-F5344CB8AC3E}">
+        <p14:creationId xmlns:p14="http://schemas.microsoft.com/office/powerpoint/2010/main" val="4179870497"/>
+      </p:ext>
+    </p:extLst>
+  </p:cSld>
+  <p:clrMapOvr>
+    <a:masterClrMapping/>
+  </p:clrMapOvr>
+  <p:timing>
+    <p:tnLst>
+      <p:par>
+        <p:cTn id="1" dur="indefinite" restart="never" nodeType="tmRoot"/>
+      </p:par>
+    </p:tnLst>
+  </p:timing>
+</p:sld>
+</file>
+
+<file path=ppt/slides/slide7.xml><?xml version="1.0" encoding="utf-8"?>
+<p:sld xmlns:a="http://schemas.openxmlformats.org/drawingml/2006/main" xmlns:r="http://schemas.openxmlformats.org/officeDocument/2006/relationships" xmlns:p="http://schemas.openxmlformats.org/presentationml/2006/main">
+  <p:cSld>
+    <p:spTree>
+      <p:nvGrpSpPr>
+        <p:cNvPr id="1" name=""/>
+        <p:cNvGrpSpPr/>
+        <p:nvPr/>
+      </p:nvGrpSpPr>
+      <p:grpSpPr>
+        <a:xfrm>
+          <a:off x="0" y="0"/>
+          <a:ext cx="0" cy="0"/>
+          <a:chOff x="0" y="0"/>
+          <a:chExt cx="0" cy="0"/>
+        </a:xfrm>
+      </p:grpSpPr>
+      <p:sp>
+        <p:nvSpPr>
+          <p:cNvPr id="5" name="Content Placeholder 4"/>
+          <p:cNvSpPr>
+            <a:spLocks noGrp="1"/>
+          </p:cNvSpPr>
+          <p:nvPr>
+            <p:ph idx="1"/>
+          </p:nvPr>
+        </p:nvSpPr>
+        <p:spPr>
+          <a:xfrm>
+            <a:off x="626532" y="2398060"/>
+            <a:ext cx="7574494" cy="962379"/>
+          </a:xfrm>
+        </p:spPr>
+        <p:txBody>
+          <a:bodyPr wrap="square">
+            <a:spAutoFit/>
+          </a:bodyPr>
+          <a:lstStyle/>
+          <a:p>
+            <a:r>
+              <a:rPr lang="en-US" dirty="0"/>
+              <a:t>Ready to answer on your questions</a:t>
+            </a:r>
+          </a:p>
+        </p:txBody>
+      </p:sp>
+      <p:sp>
+        <p:nvSpPr>
+          <p:cNvPr id="7" name="TextBox 6"/>
+          <p:cNvSpPr txBox="1"/>
+          <p:nvPr/>
+        </p:nvSpPr>
+        <p:spPr>
+          <a:xfrm>
+            <a:off x="664368" y="4125197"/>
+            <a:ext cx="7272338" cy="253916"/>
+          </a:xfrm>
+          <a:prstGeom prst="rect">
+            <a:avLst/>
+          </a:prstGeom>
+          <a:noFill/>
+        </p:spPr>
+        <p:txBody>
+          <a:bodyPr wrap="square" lIns="68580" tIns="34290" rIns="68580" bIns="34290" rtlCol="0">
+            <a:spAutoFit/>
+          </a:bodyPr>
+          <a:lstStyle/>
+          <a:p>
+            <a:r>
+              <a:rPr lang="en-US" sz="1200" b="1" dirty="0">
+                <a:solidFill>
+                  <a:schemeClr val="bg1"/>
+                </a:solidFill>
+                <a:latin typeface="Arial Black"/>
+                <a:cs typeface="Arial Black"/>
+              </a:rPr>
+              <a:t>Thank you!</a:t>
+            </a:r>
+          </a:p>
+        </p:txBody>
+      </p:sp>
+    </p:spTree>
+    <p:extLst>
+      <p:ext uri="{BB962C8B-B14F-4D97-AF65-F5344CB8AC3E}">
+        <p14:creationId xmlns:p14="http://schemas.microsoft.com/office/powerpoint/2010/main" val="3529025352"/>
       </p:ext>
     </p:extLst>
   </p:cSld>
@@ -7563,6 +8559,15 @@
 </file>
 
 <file path=customXml/item1.xml><?xml version="1.0" encoding="utf-8"?>
+<p:properties xmlns:p="http://schemas.microsoft.com/office/2006/metadata/properties" xmlns:xsi="http://www.w3.org/2001/XMLSchema-instance" xmlns:pc="http://schemas.microsoft.com/office/infopath/2007/PartnerControls">
+  <documentManagement>
+    <PublishingExpirationDate xmlns="http://schemas.microsoft.com/sharepoint/v3" xsi:nil="true"/>
+    <PublishingStartDate xmlns="http://schemas.microsoft.com/sharepoint/v3" xsi:nil="true"/>
+  </documentManagement>
+</p:properties>
+</file>
+
+<file path=customXml/item2.xml><?xml version="1.0" encoding="utf-8"?>
 <?mso-contentType ?>
 <FormTemplates xmlns="http://schemas.microsoft.com/sharepoint/v3/contenttype/forms">
   <Display>DocumentLibraryForm</Display>
@@ -7571,7 +8576,7 @@
 </FormTemplates>
 </file>
 
-<file path=customXml/item2.xml><?xml version="1.0" encoding="utf-8"?>
+<file path=customXml/item3.xml><?xml version="1.0" encoding="utf-8"?>
 <ct:contentTypeSchema xmlns:ct="http://schemas.microsoft.com/office/2006/metadata/contentType" xmlns:ma="http://schemas.microsoft.com/office/2006/metadata/properties/metaAttributes" ct:_="" ma:_="" ma:contentTypeName="Document" ma:contentTypeID="0x010100B0E9A4A7D20EA84CAA39F80EA2A19865" ma:contentTypeVersion="1" ma:contentTypeDescription="Create a new document." ma:contentTypeScope="" ma:versionID="4ed0c655cf5595f31b06ef1418ca28bf">
   <xsd:schema xmlns:xsd="http://www.w3.org/2001/XMLSchema" xmlns:xs="http://www.w3.org/2001/XMLSchema" xmlns:p="http://schemas.microsoft.com/office/2006/metadata/properties" xmlns:ns1="http://schemas.microsoft.com/sharepoint/v3" targetNamespace="http://schemas.microsoft.com/office/2006/metadata/properties" ma:root="true" ma:fieldsID="4dcce58c87e9fcebab8021569449a8d0" ns1:_="">
     <xsd:import namespace="http://schemas.microsoft.com/sharepoint/v3"/>
@@ -7703,16 +8708,23 @@
 </ct:contentTypeSchema>
 </file>
 
-<file path=customXml/item3.xml><?xml version="1.0" encoding="utf-8"?>
-<p:properties xmlns:p="http://schemas.microsoft.com/office/2006/metadata/properties" xmlns:xsi="http://www.w3.org/2001/XMLSchema-instance" xmlns:pc="http://schemas.microsoft.com/office/infopath/2007/PartnerControls">
-  <documentManagement>
-    <PublishingExpirationDate xmlns="http://schemas.microsoft.com/sharepoint/v3" xsi:nil="true"/>
-    <PublishingStartDate xmlns="http://schemas.microsoft.com/sharepoint/v3" xsi:nil="true"/>
-  </documentManagement>
-</p:properties>
+<file path=customXml/itemProps1.xml><?xml version="1.0" encoding="utf-8"?>
+<ds:datastoreItem xmlns:ds="http://schemas.openxmlformats.org/officeDocument/2006/customXml" ds:itemID="{D5E3C081-4081-47AD-A9A6-9F18F525DA1D}">
+  <ds:schemaRefs>
+    <ds:schemaRef ds:uri="http://schemas.microsoft.com/sharepoint/v3"/>
+    <ds:schemaRef ds:uri="http://purl.org/dc/terms/"/>
+    <ds:schemaRef ds:uri="http://schemas.openxmlformats.org/package/2006/metadata/core-properties"/>
+    <ds:schemaRef ds:uri="http://purl.org/dc/dcmitype/"/>
+    <ds:schemaRef ds:uri="http://schemas.microsoft.com/office/infopath/2007/PartnerControls"/>
+    <ds:schemaRef ds:uri="http://schemas.microsoft.com/office/2006/documentManagement/types"/>
+    <ds:schemaRef ds:uri="http://schemas.microsoft.com/office/2006/metadata/properties"/>
+    <ds:schemaRef ds:uri="http://www.w3.org/XML/1998/namespace"/>
+    <ds:schemaRef ds:uri="http://purl.org/dc/elements/1.1/"/>
+  </ds:schemaRefs>
+</ds:datastoreItem>
 </file>
 
-<file path=customXml/itemProps1.xml><?xml version="1.0" encoding="utf-8"?>
+<file path=customXml/itemProps2.xml><?xml version="1.0" encoding="utf-8"?>
 <ds:datastoreItem xmlns:ds="http://schemas.openxmlformats.org/officeDocument/2006/customXml" ds:itemID="{14883F0F-DE57-4ECA-B9BB-F22E8C5B5D82}">
   <ds:schemaRefs>
     <ds:schemaRef ds:uri="http://schemas.microsoft.com/sharepoint/v3/contenttype/forms"/>
@@ -7720,7 +8732,7 @@
 </ds:datastoreItem>
 </file>
 
-<file path=customXml/itemProps2.xml><?xml version="1.0" encoding="utf-8"?>
+<file path=customXml/itemProps3.xml><?xml version="1.0" encoding="utf-8"?>
 <ds:datastoreItem xmlns:ds="http://schemas.openxmlformats.org/officeDocument/2006/customXml" ds:itemID="{C3A1A37E-F8E3-427A-BCE9-B1DDB8B96CDF}">
   <ds:schemaRefs>
     <ds:schemaRef ds:uri="http://schemas.microsoft.com/office/2006/metadata/contentType"/>
@@ -7736,20 +8748,4 @@
     <ds:schemaRef ds:uri="http://schemas.microsoft.com/internal/obd"/>
   </ds:schemaRefs>
 </ds:datastoreItem>
-</file>
-
-<file path=customXml/itemProps3.xml><?xml version="1.0" encoding="utf-8"?>
-<ds:datastoreItem xmlns:ds="http://schemas.openxmlformats.org/officeDocument/2006/customXml" ds:itemID="{D5E3C081-4081-47AD-A9A6-9F18F525DA1D}">
-  <ds:schemaRefs>
-    <ds:schemaRef ds:uri="http://schemas.microsoft.com/sharepoint/v3"/>
-    <ds:schemaRef ds:uri="http://purl.org/dc/terms/"/>
-    <ds:schemaRef ds:uri="http://schemas.openxmlformats.org/package/2006/metadata/core-properties"/>
-    <ds:schemaRef ds:uri="http://purl.org/dc/dcmitype/"/>
-    <ds:schemaRef ds:uri="http://schemas.microsoft.com/office/infopath/2007/PartnerControls"/>
-    <ds:schemaRef ds:uri="http://schemas.microsoft.com/office/2006/documentManagement/types"/>
-    <ds:schemaRef ds:uri="http://schemas.microsoft.com/office/2006/metadata/properties"/>
-    <ds:schemaRef ds:uri="http://www.w3.org/XML/1998/namespace"/>
-    <ds:schemaRef ds:uri="http://purl.org/dc/elements/1.1/"/>
-  </ds:schemaRefs>
-</ds:datastoreItem>
 </file>
</xml_diff>